<commit_message>
submete antes modelo conceptual
</commit_message>
<xml_diff>
--- a/begininPP.pptx
+++ b/begininPP.pptx
@@ -119,6 +119,11 @@
       </a:defRPr>
     </a:lvl9pPr>
   </p:defaultTextStyle>
+  <p:extLst>
+    <p:ext uri="{EFAFB233-063F-42B5-8137-9DF3F51BA10A}">
+      <p15:sldGuideLst xmlns:p15="http://schemas.microsoft.com/office/powerpoint/2012/main"/>
+    </p:ext>
+  </p:extLst>
 </p:presentation>
 </file>
 
@@ -4503,11 +4508,7 @@
             </a:r>
             <a:r>
               <a:rPr lang="pt-PT" dirty="0"/>
-              <a:t>e tamanho </a:t>
-            </a:r>
-            <a:r>
-              <a:rPr lang="pt-PT" dirty="0"/>
-              <a:t>inicial</a:t>
+              <a:t>e tamanho inicial</a:t>
             </a:r>
           </a:p>
           <a:p>
@@ -4823,7 +4824,52 @@
           <a:bodyPr/>
           <a:lstStyle/>
           <a:p>
-            <a:endParaRPr lang="en-US"/>
+            <a:r>
+              <a:rPr lang="pt-PT" dirty="0" smtClean="0"/>
+              <a:t>Desenvolvimento de uma base de dados </a:t>
+            </a:r>
+          </a:p>
+          <a:p>
+            <a:r>
+              <a:rPr lang="pt-PT" dirty="0" smtClean="0"/>
+              <a:t>Requisitos de funcionamento da Biblioteca Geral da Universidade do Minho (BGUM)</a:t>
+            </a:r>
+          </a:p>
+          <a:p>
+            <a:r>
+              <a:rPr lang="pt-PT" dirty="0" smtClean="0"/>
+              <a:t>Sistemas de consultas bibliográficas e de requisiç</a:t>
+            </a:r>
+            <a:r>
+              <a:rPr lang="pt-PT" dirty="0" smtClean="0"/>
+              <a:t>ões</a:t>
+            </a:r>
+          </a:p>
+          <a:p>
+            <a:endParaRPr lang="pt-PT" dirty="0"/>
+          </a:p>
+          <a:p>
+            <a:r>
+              <a:rPr lang="pt-PT" dirty="0" smtClean="0"/>
+              <a:t>1º Levantamento de Requisitos e análise </a:t>
+            </a:r>
+          </a:p>
+          <a:p>
+            <a:r>
+              <a:rPr lang="pt-PT" dirty="0" smtClean="0"/>
+              <a:t>2º Modelo conceptual e L</a:t>
+            </a:r>
+            <a:r>
+              <a:rPr lang="en-US" dirty="0" err="1" smtClean="0"/>
+              <a:t>ógico</a:t>
+            </a:r>
+            <a:endParaRPr lang="en-US" dirty="0" smtClean="0"/>
+          </a:p>
+          <a:p>
+            <a:r>
+              <a:rPr lang="pt-PT" dirty="0" smtClean="0"/>
+              <a:t>3º Modelo físico, tamanho, povoamento…</a:t>
+            </a:r>
           </a:p>
         </p:txBody>
       </p:sp>
@@ -4895,7 +4941,49 @@
           <a:bodyPr/>
           <a:lstStyle/>
           <a:p>
-            <a:endParaRPr lang="en-US"/>
+            <a:r>
+              <a:rPr lang="pt-PT" dirty="0" smtClean="0"/>
+              <a:t>As universidades são consideradas como portais maiores de conhecimento.</a:t>
+            </a:r>
+          </a:p>
+          <a:p>
+            <a:r>
+              <a:rPr lang="pt-PT" dirty="0" smtClean="0"/>
+              <a:t>Aquisição de compe</a:t>
+            </a:r>
+            <a:r>
+              <a:rPr lang="pt-PT" dirty="0" smtClean="0"/>
+              <a:t>tências práticas e desenvolvimento do pensamento crítico e analítico. </a:t>
+            </a:r>
+          </a:p>
+          <a:p>
+            <a:r>
+              <a:rPr lang="pt-PT" dirty="0" smtClean="0"/>
+              <a:t>Acesso fácil à informação.</a:t>
+            </a:r>
+          </a:p>
+          <a:p>
+            <a:endParaRPr lang="pt-PT" dirty="0"/>
+          </a:p>
+          <a:p>
+            <a:r>
+              <a:rPr lang="pt-PT" dirty="0" smtClean="0"/>
+              <a:t>Internet </a:t>
+            </a:r>
+            <a:r>
+              <a:rPr lang="pt-PT" dirty="0" err="1" smtClean="0"/>
+              <a:t>vs</a:t>
+            </a:r>
+            <a:r>
+              <a:rPr lang="pt-PT" dirty="0" smtClean="0"/>
+              <a:t> Biblioteca</a:t>
+            </a:r>
+          </a:p>
+          <a:p>
+            <a:endParaRPr lang="pt-PT" dirty="0"/>
+          </a:p>
+          <a:p>
+            <a:endParaRPr lang="en-US" dirty="0"/>
           </a:p>
         </p:txBody>
       </p:sp>
@@ -4964,10 +5052,73 @@
         </p:nvSpPr>
         <p:spPr/>
         <p:txBody>
-          <a:bodyPr/>
-          <a:lstStyle/>
-          <a:p>
-            <a:endParaRPr lang="en-US"/>
+          <a:bodyPr>
+            <a:normAutofit lnSpcReduction="10000"/>
+          </a:bodyPr>
+          <a:lstStyle/>
+          <a:p>
+            <a:pPr lvl="0"/>
+            <a:r>
+              <a:rPr lang="pt-PT" dirty="0" smtClean="0"/>
+              <a:t>Serviços:</a:t>
+            </a:r>
+          </a:p>
+          <a:p>
+            <a:pPr lvl="0"/>
+            <a:r>
+              <a:rPr lang="pt-PT" dirty="0" smtClean="0"/>
+              <a:t>Consulta </a:t>
+            </a:r>
+            <a:r>
+              <a:rPr lang="pt-PT" dirty="0"/>
+              <a:t>de presença dos fundos documentais das bibliotecas; </a:t>
+            </a:r>
+            <a:endParaRPr lang="en-US" dirty="0"/>
+          </a:p>
+          <a:p>
+            <a:pPr lvl="0"/>
+            <a:r>
+              <a:rPr lang="pt-PT" dirty="0"/>
+              <a:t>Empréstimo de publicações para leitura domiciliária; </a:t>
+            </a:r>
+            <a:endParaRPr lang="en-US" dirty="0"/>
+          </a:p>
+          <a:p>
+            <a:pPr lvl="0"/>
+            <a:r>
+              <a:rPr lang="pt-PT" dirty="0"/>
+              <a:t>Assistência a pesquisas em bases de dados a pedido dos utilizadores; </a:t>
+            </a:r>
+            <a:endParaRPr lang="en-US" dirty="0"/>
+          </a:p>
+          <a:p>
+            <a:endParaRPr lang="pt-PT" dirty="0" smtClean="0"/>
+          </a:p>
+          <a:p>
+            <a:r>
+              <a:rPr lang="pt-PT" dirty="0" smtClean="0"/>
+              <a:t>Ações:</a:t>
+            </a:r>
+          </a:p>
+          <a:p>
+            <a:pPr lvl="0"/>
+            <a:r>
+              <a:rPr lang="pt-PT" dirty="0"/>
+              <a:t>Consultar o catálogo bibliográfico da UM (livros, revistas e outros suportes de informação disponíveis nas bibliotecas UM), bases de dados bibliográficas, revistas em formato eletrónico e outros recursos de informação; </a:t>
+            </a:r>
+            <a:endParaRPr lang="en-US" dirty="0"/>
+          </a:p>
+          <a:p>
+            <a:pPr lvl="0"/>
+            <a:r>
+              <a:rPr lang="pt-PT" dirty="0"/>
+              <a:t>Consultar ficha de utilizador, onde é possível renovar e reservar empréstimos e publicações</a:t>
+            </a:r>
+            <a:r>
+              <a:rPr lang="pt-PT" dirty="0" smtClean="0"/>
+              <a:t>.</a:t>
+            </a:r>
+            <a:endParaRPr lang="en-US" dirty="0"/>
           </a:p>
         </p:txBody>
       </p:sp>
@@ -5039,7 +5190,41 @@
           <a:bodyPr/>
           <a:lstStyle/>
           <a:p>
-            <a:endParaRPr lang="en-US"/>
+            <a:r>
+              <a:rPr lang="pt-PT" dirty="0" smtClean="0"/>
+              <a:t>Sistemas de informação estão acrescer em dimensão;</a:t>
+            </a:r>
+          </a:p>
+          <a:p>
+            <a:r>
+              <a:rPr lang="pt-PT" dirty="0" smtClean="0"/>
+              <a:t>Necessidade premente de uma resposta eficiente e eficaz.</a:t>
+            </a:r>
+          </a:p>
+          <a:p>
+            <a:endParaRPr lang="pt-PT" dirty="0"/>
+          </a:p>
+          <a:p>
+            <a:r>
+              <a:rPr lang="pt-PT" dirty="0" smtClean="0"/>
+              <a:t>O caso de estudo permite perceber o funcionamento de uma biblioteca.</a:t>
+            </a:r>
+          </a:p>
+          <a:p>
+            <a:r>
+              <a:rPr lang="pt-PT" dirty="0" smtClean="0"/>
+              <a:t>Pode ser reaproveitado para outros casos de estudo (comércio a retalho, etc. …) pois envolve a catalogação e localização dos produtos em questão.</a:t>
+            </a:r>
+          </a:p>
+          <a:p>
+            <a:endParaRPr lang="pt-PT" dirty="0"/>
+          </a:p>
+          <a:p>
+            <a:r>
+              <a:rPr lang="pt-PT" dirty="0" smtClean="0"/>
+              <a:t>Solidificar de forma estruturada conhecimentos fundamentais na conceção, desenho e implementação de uma base de dados relacional.</a:t>
+            </a:r>
+            <a:endParaRPr lang="en-US" dirty="0"/>
           </a:p>
         </p:txBody>
       </p:sp>
@@ -5108,8 +5293,55 @@
         </p:nvSpPr>
         <p:spPr/>
         <p:txBody>
-          <a:bodyPr/>
-          <a:lstStyle/>
+          <a:bodyPr>
+            <a:normAutofit/>
+          </a:bodyPr>
+          <a:lstStyle/>
+          <a:p>
+            <a:pPr algn="just"/>
+            <a:r>
+              <a:rPr lang="pt-PT" sz="3200" dirty="0" smtClean="0"/>
+              <a:t>Criar um sistema de Base de Dados que respeite os requisitos da BGUM para satisfazer os seus utilizadores.</a:t>
+            </a:r>
+          </a:p>
+          <a:p>
+            <a:pPr lvl="1" algn="just"/>
+            <a:r>
+              <a:rPr lang="pt-PT" sz="2800" dirty="0" smtClean="0"/>
+              <a:t>Para isso foi seguido um modelo de desenvolvimento de base de dados por etapas:</a:t>
+            </a:r>
+          </a:p>
+          <a:p>
+            <a:pPr lvl="2" algn="just"/>
+            <a:r>
+              <a:rPr lang="pt-PT" sz="2000" dirty="0" smtClean="0"/>
+              <a:t>Recolher informação</a:t>
+            </a:r>
+          </a:p>
+          <a:p>
+            <a:pPr lvl="2" algn="just"/>
+            <a:r>
+              <a:rPr lang="pt-PT" sz="2000" dirty="0" smtClean="0"/>
+              <a:t>Analisar informação</a:t>
+            </a:r>
+          </a:p>
+          <a:p>
+            <a:pPr lvl="2" algn="just"/>
+            <a:r>
+              <a:rPr lang="pt-PT" sz="2000" dirty="0" smtClean="0"/>
+              <a:t>Elaborar modelos conceptual, lógico e físico (de acordo com os requisitos)</a:t>
+            </a:r>
+          </a:p>
+          <a:p>
+            <a:pPr lvl="2" algn="just"/>
+            <a:r>
+              <a:rPr lang="pt-PT" sz="2000" dirty="0" smtClean="0"/>
+              <a:t>Validar os mesmos</a:t>
+            </a:r>
+          </a:p>
+          <a:p>
+            <a:endParaRPr lang="pt-PT" dirty="0"/>
+          </a:p>
           <a:p>
             <a:endParaRPr lang="en-US" dirty="0"/>
           </a:p>
@@ -5161,10 +5393,10 @@
           <a:lstStyle/>
           <a:p>
             <a:r>
-              <a:rPr lang="pt-PT" dirty="0" smtClean="0"/>
+              <a:rPr lang="pt-PT" b="1" dirty="0" smtClean="0"/>
               <a:t>MODELO CONCEPTUAL</a:t>
             </a:r>
-            <a:endParaRPr lang="en-US" dirty="0"/>
+            <a:endParaRPr lang="en-US" b="1" dirty="0"/>
           </a:p>
         </p:txBody>
       </p:sp>

</xml_diff>

<commit_message>
dispositivo 17 ou + qql coisa
</commit_message>
<xml_diff>
--- a/begininPP.pptx
+++ b/begininPP.pptx
@@ -17,20 +17,24 @@
     <p:sldId id="277" r:id="rId11"/>
     <p:sldId id="278" r:id="rId12"/>
     <p:sldId id="272" r:id="rId13"/>
-    <p:sldId id="273" r:id="rId14"/>
-    <p:sldId id="279" r:id="rId15"/>
-    <p:sldId id="274" r:id="rId16"/>
-    <p:sldId id="275" r:id="rId17"/>
-    <p:sldId id="280" r:id="rId18"/>
-    <p:sldId id="281" r:id="rId19"/>
-    <p:sldId id="276" r:id="rId20"/>
-    <p:sldId id="265" r:id="rId21"/>
-    <p:sldId id="264" r:id="rId22"/>
-    <p:sldId id="269" r:id="rId23"/>
-    <p:sldId id="267" r:id="rId24"/>
-    <p:sldId id="266" r:id="rId25"/>
-    <p:sldId id="270" r:id="rId26"/>
-    <p:sldId id="271" r:id="rId27"/>
+    <p:sldId id="282" r:id="rId14"/>
+    <p:sldId id="283" r:id="rId15"/>
+    <p:sldId id="273" r:id="rId16"/>
+    <p:sldId id="284" r:id="rId17"/>
+    <p:sldId id="285" r:id="rId18"/>
+    <p:sldId id="279" r:id="rId19"/>
+    <p:sldId id="274" r:id="rId20"/>
+    <p:sldId id="275" r:id="rId21"/>
+    <p:sldId id="280" r:id="rId22"/>
+    <p:sldId id="281" r:id="rId23"/>
+    <p:sldId id="276" r:id="rId24"/>
+    <p:sldId id="265" r:id="rId25"/>
+    <p:sldId id="264" r:id="rId26"/>
+    <p:sldId id="269" r:id="rId27"/>
+    <p:sldId id="267" r:id="rId28"/>
+    <p:sldId id="266" r:id="rId29"/>
+    <p:sldId id="270" r:id="rId30"/>
+    <p:sldId id="271" r:id="rId31"/>
   </p:sldIdLst>
   <p:sldSz cx="12192000" cy="6858000"/>
   <p:notesSz cx="6858000" cy="9144000"/>
@@ -3023,11 +3027,7 @@
             </a:pPr>
             <a:r>
               <a:rPr lang="pt-PT" dirty="0" smtClean="0"/>
-              <a:t>BGUM – Gestão de Base de </a:t>
-            </a:r>
-            <a:r>
-              <a:rPr lang="pt-PT" dirty="0" smtClean="0"/>
-              <a:t>dados</a:t>
+              <a:t>BGUM – Gestão de Base de dados</a:t>
             </a:r>
             <a:br>
               <a:rPr lang="pt-PT" dirty="0" smtClean="0"/>
@@ -3334,13 +3334,8 @@
             <a:pPr algn="r"/>
             <a:r>
               <a:rPr lang="pt-PT" sz="1600" dirty="0"/>
-              <a:t>Mariana Carvalho </a:t>
-            </a:r>
-            <a:r>
-              <a:rPr lang="pt-PT" sz="1600" dirty="0"/>
-              <a:t>a67635</a:t>
-            </a:r>
-            <a:endParaRPr lang="pt-PT" sz="1600" dirty="0"/>
+              <a:t>Mariana Carvalho a67635</a:t>
+            </a:r>
           </a:p>
           <a:p>
             <a:pPr algn="r">
@@ -3358,13 +3353,8 @@
             </a:r>
             <a:r>
               <a:rPr lang="pt-PT" sz="1600" dirty="0"/>
-              <a:t>a</a:t>
-            </a:r>
-            <a:r>
-              <a:rPr lang="pt-PT" sz="1600" dirty="0"/>
-              <a:t>61778</a:t>
-            </a:r>
-            <a:endParaRPr lang="pt-PT" sz="1600" dirty="0"/>
+              <a:t>a61778</a:t>
+            </a:r>
           </a:p>
           <a:p>
             <a:pPr algn="r"/>
@@ -4785,42 +4775,70 @@
           <a:bodyPr/>
           <a:lstStyle/>
           <a:p>
+            <a:pPr marL="514350" indent="-514350">
+              <a:buFont typeface="+mj-lt"/>
+              <a:buAutoNum type="arabicPeriod"/>
+            </a:pPr>
             <a:r>
               <a:rPr lang="pt-PT" dirty="0" smtClean="0"/>
               <a:t>Livro</a:t>
             </a:r>
           </a:p>
           <a:p>
+            <a:pPr marL="514350" indent="-514350">
+              <a:buFont typeface="+mj-lt"/>
+              <a:buAutoNum type="arabicPeriod"/>
+            </a:pPr>
             <a:r>
               <a:rPr lang="pt-PT" dirty="0" smtClean="0"/>
               <a:t>Autor e Editora</a:t>
             </a:r>
           </a:p>
           <a:p>
+            <a:pPr marL="514350" indent="-514350">
+              <a:buFont typeface="+mj-lt"/>
+              <a:buAutoNum type="arabicPeriod"/>
+            </a:pPr>
             <a:r>
               <a:rPr lang="pt-PT" dirty="0" smtClean="0"/>
               <a:t>Exemplar e Utilizador</a:t>
             </a:r>
           </a:p>
           <a:p>
+            <a:pPr marL="514350" indent="-514350">
+              <a:buFont typeface="+mj-lt"/>
+              <a:buAutoNum type="arabicPeriod"/>
+            </a:pPr>
             <a:r>
               <a:rPr lang="pt-PT" dirty="0" smtClean="0"/>
               <a:t>Utilizador</a:t>
             </a:r>
           </a:p>
           <a:p>
+            <a:pPr marL="514350" indent="-514350">
+              <a:buFont typeface="+mj-lt"/>
+              <a:buAutoNum type="arabicPeriod"/>
+            </a:pPr>
             <a:r>
               <a:rPr lang="pt-PT" dirty="0" smtClean="0"/>
               <a:t>Requisições</a:t>
             </a:r>
           </a:p>
           <a:p>
+            <a:pPr marL="514350" indent="-514350">
+              <a:buFont typeface="+mj-lt"/>
+              <a:buAutoNum type="arabicPeriod"/>
+            </a:pPr>
             <a:r>
               <a:rPr lang="pt-PT" dirty="0" smtClean="0"/>
               <a:t>Localização</a:t>
             </a:r>
           </a:p>
           <a:p>
+            <a:pPr marL="514350" indent="-514350">
+              <a:buFont typeface="+mj-lt"/>
+              <a:buAutoNum type="arabicPeriod"/>
+            </a:pPr>
             <a:r>
               <a:rPr lang="pt-PT" dirty="0" smtClean="0"/>
               <a:t>Coleção</a:t>
@@ -5267,29 +5285,6 @@
       </p:grpSpPr>
       <p:sp>
         <p:nvSpPr>
-          <p:cNvPr id="2" name="Título 1"/>
-          <p:cNvSpPr>
-            <a:spLocks noGrp="1"/>
-          </p:cNvSpPr>
-          <p:nvPr>
-            <p:ph type="title"/>
-          </p:nvPr>
-        </p:nvSpPr>
-        <p:spPr/>
-        <p:txBody>
-          <a:bodyPr/>
-          <a:lstStyle/>
-          <a:p>
-            <a:r>
-              <a:rPr lang="pt-PT" dirty="0" smtClean="0"/>
-              <a:t>Identificação dos Relacionamentos</a:t>
-            </a:r>
-            <a:endParaRPr lang="en-US" dirty="0"/>
-          </a:p>
-        </p:txBody>
-      </p:sp>
-      <p:sp>
-        <p:nvSpPr>
           <p:cNvPr id="3" name="Marcador de Posição de Conteúdo 2"/>
           <p:cNvSpPr>
             <a:spLocks noGrp="1"/>
@@ -5298,102 +5293,715 @@
             <p:ph idx="1"/>
           </p:nvPr>
         </p:nvSpPr>
-        <p:spPr/>
-        <p:txBody>
-          <a:bodyPr/>
+        <p:spPr>
+          <a:xfrm>
+            <a:off x="1676400" y="1575743"/>
+            <a:ext cx="10515600" cy="490318"/>
+          </a:xfrm>
+        </p:spPr>
+        <p:txBody>
+          <a:bodyPr>
+            <a:normAutofit fontScale="92500"/>
+          </a:bodyPr>
           <a:lstStyle/>
           <a:p>
-            <a:pPr marL="514350" indent="-514350">
-              <a:buFont typeface="+mj-lt"/>
-              <a:buAutoNum type="arabicPeriod"/>
-            </a:pPr>
-            <a:r>
-              <a:rPr lang="pt-PT" dirty="0" smtClean="0"/>
-              <a:t>Livro-Autor</a:t>
-            </a:r>
-          </a:p>
-          <a:p>
-            <a:pPr marL="514350" indent="-514350">
-              <a:buFont typeface="+mj-lt"/>
-              <a:buAutoNum type="arabicPeriod"/>
-            </a:pPr>
-            <a:r>
-              <a:rPr lang="pt-PT" dirty="0" smtClean="0"/>
-              <a:t>Livro-Editora</a:t>
-            </a:r>
-          </a:p>
-          <a:p>
-            <a:pPr marL="514350" indent="-514350">
-              <a:buFont typeface="+mj-lt"/>
-              <a:buAutoNum type="arabicPeriod"/>
-            </a:pPr>
-            <a:r>
-              <a:rPr lang="pt-PT" dirty="0" smtClean="0"/>
-              <a:t>Livro-Exemplar</a:t>
-            </a:r>
-          </a:p>
-          <a:p>
-            <a:pPr marL="514350" indent="-514350">
-              <a:buFont typeface="+mj-lt"/>
-              <a:buAutoNum type="arabicPeriod"/>
-            </a:pPr>
-            <a:r>
-              <a:rPr lang="pt-PT" dirty="0" smtClean="0"/>
-              <a:t>Exemplar-Requisição</a:t>
-            </a:r>
-          </a:p>
-          <a:p>
-            <a:pPr marL="514350" indent="-514350">
-              <a:buFont typeface="+mj-lt"/>
-              <a:buAutoNum type="arabicPeriod"/>
-            </a:pPr>
-            <a:r>
-              <a:rPr lang="pt-PT" dirty="0" smtClean="0"/>
-              <a:t>Exemplar-Utilizador</a:t>
-            </a:r>
-          </a:p>
-          <a:p>
-            <a:pPr marL="514350" indent="-514350">
-              <a:buFont typeface="+mj-lt"/>
-              <a:buAutoNum type="arabicPeriod"/>
-            </a:pPr>
-            <a:r>
-              <a:rPr lang="pt-PT" dirty="0" smtClean="0"/>
-              <a:t>Exemplar-Localização</a:t>
-            </a:r>
-          </a:p>
-          <a:p>
-            <a:pPr marL="514350" indent="-514350">
-              <a:buFont typeface="+mj-lt"/>
-              <a:buAutoNum type="arabicPeriod"/>
-            </a:pPr>
-            <a:r>
-              <a:rPr lang="pt-PT" dirty="0" smtClean="0"/>
-              <a:t>Requisição-Utilizador</a:t>
-            </a:r>
-          </a:p>
-          <a:p>
-            <a:pPr marL="514350" indent="-514350">
-              <a:buFont typeface="+mj-lt"/>
-              <a:buAutoNum type="arabicPeriod"/>
-            </a:pPr>
-            <a:r>
-              <a:rPr lang="pt-PT" dirty="0" smtClean="0"/>
-              <a:t>Coleção-Livro</a:t>
-            </a:r>
-          </a:p>
-          <a:p>
+            <a:r>
+              <a:rPr lang="pt-PT" dirty="0" smtClean="0"/>
+              <a:t>1. Livro: consulta e gestão de requisições/reservas feitas pelos utentes</a:t>
+            </a:r>
+            <a:endParaRPr lang="en-US" dirty="0"/>
+          </a:p>
+        </p:txBody>
+      </p:sp>
+      <p:pic>
+        <p:nvPicPr>
+          <p:cNvPr id="4" name="Picture 4" descr="http://pngimg.com/upload/book_PNG2116.png"/>
+          <p:cNvPicPr>
+            <a:picLocks noChangeAspect="1" noChangeArrowheads="1"/>
+          </p:cNvPicPr>
+          <p:nvPr/>
+        </p:nvPicPr>
+        <p:blipFill>
+          <a:blip r:embed="rId2" cstate="print">
+            <a:extLst>
+              <a:ext uri="{28A0092B-C50C-407E-A947-70E740481C1C}">
+                <a14:useLocalDpi xmlns:a14="http://schemas.microsoft.com/office/drawing/2010/main" val="0"/>
+              </a:ext>
+            </a:extLst>
+          </a:blip>
+          <a:srcRect/>
+          <a:stretch>
+            <a:fillRect/>
+          </a:stretch>
+        </p:blipFill>
+        <p:spPr bwMode="auto">
+          <a:xfrm>
+            <a:off x="422059" y="365125"/>
+            <a:ext cx="1738046" cy="1355676"/>
+          </a:xfrm>
+          <a:prstGeom prst="rect">
+            <a:avLst/>
+          </a:prstGeom>
+          <a:noFill/>
+          <a:extLst>
+            <a:ext uri="{909E8E84-426E-40DD-AFC4-6F175D3DCCD1}">
+              <a14:hiddenFill xmlns:a14="http://schemas.microsoft.com/office/drawing/2010/main">
+                <a:solidFill>
+                  <a:srgbClr val="FFFFFF"/>
+                </a:solidFill>
+              </a14:hiddenFill>
+            </a:ext>
+          </a:extLst>
+        </p:spPr>
+      </p:pic>
+      <p:pic>
+        <p:nvPicPr>
+          <p:cNvPr id="5" name="Picture 6" descr="http://upload.wikimedia.org/wikipedia/commons/3/3f/Der_Autor.jpg"/>
+          <p:cNvPicPr>
+            <a:picLocks noChangeAspect="1" noChangeArrowheads="1"/>
+          </p:cNvPicPr>
+          <p:nvPr/>
+        </p:nvPicPr>
+        <p:blipFill>
+          <a:blip r:embed="rId3" cstate="print">
+            <a:extLst>
+              <a:ext uri="{28A0092B-C50C-407E-A947-70E740481C1C}">
+                <a14:useLocalDpi xmlns:a14="http://schemas.microsoft.com/office/drawing/2010/main" val="0"/>
+              </a:ext>
+            </a:extLst>
+          </a:blip>
+          <a:srcRect/>
+          <a:stretch>
+            <a:fillRect/>
+          </a:stretch>
+        </p:blipFill>
+        <p:spPr bwMode="auto">
+          <a:xfrm>
+            <a:off x="422059" y="2840941"/>
+            <a:ext cx="1317624" cy="896664"/>
+          </a:xfrm>
+          <a:prstGeom prst="rect">
+            <a:avLst/>
+          </a:prstGeom>
+          <a:noFill/>
+          <a:extLst>
+            <a:ext uri="{909E8E84-426E-40DD-AFC4-6F175D3DCCD1}">
+              <a14:hiddenFill xmlns:a14="http://schemas.microsoft.com/office/drawing/2010/main">
+                <a:solidFill>
+                  <a:srgbClr val="FFFFFF"/>
+                </a:solidFill>
+              </a14:hiddenFill>
+            </a:ext>
+          </a:extLst>
+        </p:spPr>
+      </p:pic>
+      <p:pic>
+        <p:nvPicPr>
+          <p:cNvPr id="6" name="Picture 8" descr="http://diariodigital.sapo.pt/images_content/2013/PortoEditoraLogo.jpg"/>
+          <p:cNvPicPr>
+            <a:picLocks noChangeAspect="1" noChangeArrowheads="1"/>
+          </p:cNvPicPr>
+          <p:nvPr/>
+        </p:nvPicPr>
+        <p:blipFill>
+          <a:blip r:embed="rId4" cstate="print">
+            <a:extLst>
+              <a:ext uri="{28A0092B-C50C-407E-A947-70E740481C1C}">
+                <a14:useLocalDpi xmlns:a14="http://schemas.microsoft.com/office/drawing/2010/main" val="0"/>
+              </a:ext>
+            </a:extLst>
+          </a:blip>
+          <a:srcRect/>
+          <a:stretch>
+            <a:fillRect/>
+          </a:stretch>
+        </p:blipFill>
+        <p:spPr bwMode="auto">
+          <a:xfrm>
+            <a:off x="1676400" y="2471450"/>
+            <a:ext cx="1349334" cy="579042"/>
+          </a:xfrm>
+          <a:prstGeom prst="rect">
+            <a:avLst/>
+          </a:prstGeom>
+          <a:noFill/>
+          <a:extLst>
+            <a:ext uri="{909E8E84-426E-40DD-AFC4-6F175D3DCCD1}">
+              <a14:hiddenFill xmlns:a14="http://schemas.microsoft.com/office/drawing/2010/main">
+                <a:solidFill>
+                  <a:srgbClr val="FFFFFF"/>
+                </a:solidFill>
+              </a14:hiddenFill>
+            </a:ext>
+          </a:extLst>
+        </p:spPr>
+      </p:pic>
+      <p:sp>
+        <p:nvSpPr>
+          <p:cNvPr id="7" name="Marcador de Posição de Conteúdo 2"/>
+          <p:cNvSpPr txBox="1">
+            <a:spLocks/>
+          </p:cNvSpPr>
+          <p:nvPr/>
+        </p:nvSpPr>
+        <p:spPr>
+          <a:xfrm>
+            <a:off x="1676400" y="3174824"/>
+            <a:ext cx="10515600" cy="1337662"/>
+          </a:xfrm>
+          <a:prstGeom prst="rect">
+            <a:avLst/>
+          </a:prstGeom>
+        </p:spPr>
+        <p:txBody>
+          <a:bodyPr vert="horz" lIns="91440" tIns="45720" rIns="91440" bIns="45720" rtlCol="0">
+            <a:normAutofit fontScale="92500"/>
+          </a:bodyPr>
+          <a:lstStyle>
+            <a:lvl1pPr marL="228600" indent="-228600" algn="l" defTabSz="914400" rtl="0" eaLnBrk="1" latinLnBrk="0" hangingPunct="1">
+              <a:lnSpc>
+                <a:spcPct val="90000"/>
+              </a:lnSpc>
+              <a:spcBef>
+                <a:spcPts val="1000"/>
+              </a:spcBef>
+              <a:buFont typeface="Arial" panose="020B0604020202020204" pitchFamily="34" charset="0"/>
+              <a:buChar char="•"/>
+              <a:defRPr sz="2800" kern="1200">
+                <a:solidFill>
+                  <a:schemeClr val="tx1"/>
+                </a:solidFill>
+                <a:latin typeface="+mn-lt"/>
+                <a:ea typeface="+mn-ea"/>
+                <a:cs typeface="+mn-cs"/>
+              </a:defRPr>
+            </a:lvl1pPr>
+            <a:lvl2pPr marL="685800" indent="-228600" algn="l" defTabSz="914400" rtl="0" eaLnBrk="1" latinLnBrk="0" hangingPunct="1">
+              <a:lnSpc>
+                <a:spcPct val="90000"/>
+              </a:lnSpc>
+              <a:spcBef>
+                <a:spcPts val="500"/>
+              </a:spcBef>
+              <a:buFont typeface="Arial" panose="020B0604020202020204" pitchFamily="34" charset="0"/>
+              <a:buChar char="•"/>
+              <a:defRPr sz="2400" kern="1200">
+                <a:solidFill>
+                  <a:schemeClr val="tx1"/>
+                </a:solidFill>
+                <a:latin typeface="+mn-lt"/>
+                <a:ea typeface="+mn-ea"/>
+                <a:cs typeface="+mn-cs"/>
+              </a:defRPr>
+            </a:lvl2pPr>
+            <a:lvl3pPr marL="1143000" indent="-228600" algn="l" defTabSz="914400" rtl="0" eaLnBrk="1" latinLnBrk="0" hangingPunct="1">
+              <a:lnSpc>
+                <a:spcPct val="90000"/>
+              </a:lnSpc>
+              <a:spcBef>
+                <a:spcPts val="500"/>
+              </a:spcBef>
+              <a:buFont typeface="Arial" panose="020B0604020202020204" pitchFamily="34" charset="0"/>
+              <a:buChar char="•"/>
+              <a:defRPr sz="2000" kern="1200">
+                <a:solidFill>
+                  <a:schemeClr val="tx1"/>
+                </a:solidFill>
+                <a:latin typeface="+mn-lt"/>
+                <a:ea typeface="+mn-ea"/>
+                <a:cs typeface="+mn-cs"/>
+              </a:defRPr>
+            </a:lvl3pPr>
+            <a:lvl4pPr marL="1600200" indent="-228600" algn="l" defTabSz="914400" rtl="0" eaLnBrk="1" latinLnBrk="0" hangingPunct="1">
+              <a:lnSpc>
+                <a:spcPct val="90000"/>
+              </a:lnSpc>
+              <a:spcBef>
+                <a:spcPts val="500"/>
+              </a:spcBef>
+              <a:buFont typeface="Arial" panose="020B0604020202020204" pitchFamily="34" charset="0"/>
+              <a:buChar char="•"/>
+              <a:defRPr sz="1800" kern="1200">
+                <a:solidFill>
+                  <a:schemeClr val="tx1"/>
+                </a:solidFill>
+                <a:latin typeface="+mn-lt"/>
+                <a:ea typeface="+mn-ea"/>
+                <a:cs typeface="+mn-cs"/>
+              </a:defRPr>
+            </a:lvl4pPr>
+            <a:lvl5pPr marL="2057400" indent="-228600" algn="l" defTabSz="914400" rtl="0" eaLnBrk="1" latinLnBrk="0" hangingPunct="1">
+              <a:lnSpc>
+                <a:spcPct val="90000"/>
+              </a:lnSpc>
+              <a:spcBef>
+                <a:spcPts val="500"/>
+              </a:spcBef>
+              <a:buFont typeface="Arial" panose="020B0604020202020204" pitchFamily="34" charset="0"/>
+              <a:buChar char="•"/>
+              <a:defRPr sz="1800" kern="1200">
+                <a:solidFill>
+                  <a:schemeClr val="tx1"/>
+                </a:solidFill>
+                <a:latin typeface="+mn-lt"/>
+                <a:ea typeface="+mn-ea"/>
+                <a:cs typeface="+mn-cs"/>
+              </a:defRPr>
+            </a:lvl5pPr>
+            <a:lvl6pPr marL="2514600" indent="-228600" algn="l" defTabSz="914400" rtl="0" eaLnBrk="1" latinLnBrk="0" hangingPunct="1">
+              <a:lnSpc>
+                <a:spcPct val="90000"/>
+              </a:lnSpc>
+              <a:spcBef>
+                <a:spcPts val="500"/>
+              </a:spcBef>
+              <a:buFont typeface="Arial" panose="020B0604020202020204" pitchFamily="34" charset="0"/>
+              <a:buChar char="•"/>
+              <a:defRPr sz="1800" kern="1200">
+                <a:solidFill>
+                  <a:schemeClr val="tx1"/>
+                </a:solidFill>
+                <a:latin typeface="+mn-lt"/>
+                <a:ea typeface="+mn-ea"/>
+                <a:cs typeface="+mn-cs"/>
+              </a:defRPr>
+            </a:lvl6pPr>
+            <a:lvl7pPr marL="2971800" indent="-228600" algn="l" defTabSz="914400" rtl="0" eaLnBrk="1" latinLnBrk="0" hangingPunct="1">
+              <a:lnSpc>
+                <a:spcPct val="90000"/>
+              </a:lnSpc>
+              <a:spcBef>
+                <a:spcPts val="500"/>
+              </a:spcBef>
+              <a:buFont typeface="Arial" panose="020B0604020202020204" pitchFamily="34" charset="0"/>
+              <a:buChar char="•"/>
+              <a:defRPr sz="1800" kern="1200">
+                <a:solidFill>
+                  <a:schemeClr val="tx1"/>
+                </a:solidFill>
+                <a:latin typeface="+mn-lt"/>
+                <a:ea typeface="+mn-ea"/>
+                <a:cs typeface="+mn-cs"/>
+              </a:defRPr>
+            </a:lvl7pPr>
+            <a:lvl8pPr marL="3429000" indent="-228600" algn="l" defTabSz="914400" rtl="0" eaLnBrk="1" latinLnBrk="0" hangingPunct="1">
+              <a:lnSpc>
+                <a:spcPct val="90000"/>
+              </a:lnSpc>
+              <a:spcBef>
+                <a:spcPts val="500"/>
+              </a:spcBef>
+              <a:buFont typeface="Arial" panose="020B0604020202020204" pitchFamily="34" charset="0"/>
+              <a:buChar char="•"/>
+              <a:defRPr sz="1800" kern="1200">
+                <a:solidFill>
+                  <a:schemeClr val="tx1"/>
+                </a:solidFill>
+                <a:latin typeface="+mn-lt"/>
+                <a:ea typeface="+mn-ea"/>
+                <a:cs typeface="+mn-cs"/>
+              </a:defRPr>
+            </a:lvl8pPr>
+            <a:lvl9pPr marL="3886200" indent="-228600" algn="l" defTabSz="914400" rtl="0" eaLnBrk="1" latinLnBrk="0" hangingPunct="1">
+              <a:lnSpc>
+                <a:spcPct val="90000"/>
+              </a:lnSpc>
+              <a:spcBef>
+                <a:spcPts val="500"/>
+              </a:spcBef>
+              <a:buFont typeface="Arial" panose="020B0604020202020204" pitchFamily="34" charset="0"/>
+              <a:buChar char="•"/>
+              <a:defRPr sz="1800" kern="1200">
+                <a:solidFill>
+                  <a:schemeClr val="tx1"/>
+                </a:solidFill>
+                <a:latin typeface="+mn-lt"/>
+                <a:ea typeface="+mn-ea"/>
+                <a:cs typeface="+mn-cs"/>
+              </a:defRPr>
+            </a:lvl9pPr>
+          </a:lstStyle>
+          <a:p>
+            <a:r>
+              <a:rPr lang="pt-PT" dirty="0"/>
+              <a:t>2</a:t>
+            </a:r>
+            <a:r>
+              <a:rPr lang="pt-PT" dirty="0" smtClean="0"/>
+              <a:t>. Escritor e Editora: prevenir duplicação de dados e evitar redundância; </a:t>
+            </a:r>
+            <a:br>
+              <a:rPr lang="pt-PT" dirty="0" smtClean="0"/>
+            </a:br>
+            <a:r>
+              <a:rPr lang="pt-PT" dirty="0" smtClean="0"/>
+              <a:t>Podiam ser atributos mas são entidades pois a editora </a:t>
+            </a:r>
+            <a:r>
+              <a:rPr lang="pt-PT" dirty="0" err="1" smtClean="0"/>
+              <a:t>tamb</a:t>
+            </a:r>
+            <a:r>
+              <a:rPr lang="en-US" dirty="0" err="1" smtClean="0"/>
+              <a:t>ém</a:t>
+            </a:r>
+            <a:r>
+              <a:rPr lang="en-US" dirty="0" smtClean="0"/>
+              <a:t> </a:t>
+            </a:r>
+            <a:r>
+              <a:rPr lang="en-US" dirty="0" err="1" smtClean="0"/>
+              <a:t>pode</a:t>
+            </a:r>
+            <a:r>
+              <a:rPr lang="en-US" dirty="0" smtClean="0"/>
+              <a:t> </a:t>
+            </a:r>
+            <a:r>
+              <a:rPr lang="en-US" dirty="0" err="1" smtClean="0"/>
+              <a:t>ter</a:t>
+            </a:r>
+            <a:r>
+              <a:rPr lang="en-US" dirty="0" smtClean="0"/>
+              <a:t> </a:t>
+            </a:r>
+            <a:r>
+              <a:rPr lang="en-US" dirty="0" err="1" smtClean="0"/>
+              <a:t>muitas</a:t>
+            </a:r>
+            <a:r>
+              <a:rPr lang="en-US" dirty="0" smtClean="0"/>
+              <a:t> </a:t>
+            </a:r>
+            <a:r>
+              <a:rPr lang="en-US" dirty="0" err="1" smtClean="0"/>
+              <a:t>publicações</a:t>
+            </a:r>
+            <a:r>
+              <a:rPr lang="en-US" dirty="0"/>
+              <a:t> </a:t>
+            </a:r>
+            <a:r>
+              <a:rPr lang="en-US" dirty="0" smtClean="0"/>
+              <a:t>-&gt; </a:t>
+            </a:r>
+            <a:r>
+              <a:rPr lang="en-US" dirty="0" err="1" smtClean="0"/>
+              <a:t>redundâncias</a:t>
+            </a:r>
             <a:endParaRPr lang="pt-PT" dirty="0" smtClean="0"/>
           </a:p>
-          <a:p>
-            <a:endParaRPr lang="en-US" dirty="0"/>
+        </p:txBody>
+      </p:sp>
+      <p:pic>
+        <p:nvPicPr>
+          <p:cNvPr id="8" name="Picture 10" descr="http://algunsmomentos.com.br/wp-content/uploads/2014/07/garota_exemplar_Alguns_Momentos-3-2.jpg"/>
+          <p:cNvPicPr>
+            <a:picLocks noChangeAspect="1" noChangeArrowheads="1"/>
+          </p:cNvPicPr>
+          <p:nvPr/>
+        </p:nvPicPr>
+        <p:blipFill>
+          <a:blip r:embed="rId5" cstate="print">
+            <a:extLst>
+              <a:ext uri="{28A0092B-C50C-407E-A947-70E740481C1C}">
+                <a14:useLocalDpi xmlns:a14="http://schemas.microsoft.com/office/drawing/2010/main" val="0"/>
+              </a:ext>
+            </a:extLst>
+          </a:blip>
+          <a:srcRect/>
+          <a:stretch>
+            <a:fillRect/>
+          </a:stretch>
+        </p:blipFill>
+        <p:spPr bwMode="auto">
+          <a:xfrm>
+            <a:off x="493978" y="4520207"/>
+            <a:ext cx="2491409" cy="1661750"/>
+          </a:xfrm>
+          <a:prstGeom prst="roundRect">
+            <a:avLst>
+              <a:gd name="adj" fmla="val 16667"/>
+            </a:avLst>
+          </a:prstGeom>
+          <a:ln>
+            <a:noFill/>
+          </a:ln>
+          <a:effectLst>
+            <a:outerShdw blurRad="76200" dist="38100" dir="7800000" algn="tl" rotWithShape="0">
+              <a:srgbClr val="000000">
+                <a:alpha val="40000"/>
+              </a:srgbClr>
+            </a:outerShdw>
+          </a:effectLst>
+          <a:scene3d>
+            <a:camera prst="orthographicFront"/>
+            <a:lightRig rig="contrasting" dir="t">
+              <a:rot lat="0" lon="0" rev="4200000"/>
+            </a:lightRig>
+          </a:scene3d>
+          <a:sp3d prstMaterial="plastic">
+            <a:bevelT w="381000" h="114300" prst="relaxedInset"/>
+            <a:contourClr>
+              <a:srgbClr val="969696"/>
+            </a:contourClr>
+          </a:sp3d>
+          <a:extLst>
+            <a:ext uri="{909E8E84-426E-40DD-AFC4-6F175D3DCCD1}">
+              <a14:hiddenFill xmlns:a14="http://schemas.microsoft.com/office/drawing/2010/main">
+                <a:solidFill>
+                  <a:srgbClr val="FFFFFF"/>
+                </a:solidFill>
+              </a14:hiddenFill>
+            </a:ext>
+          </a:extLst>
+        </p:spPr>
+      </p:pic>
+      <p:pic>
+        <p:nvPicPr>
+          <p:cNvPr id="9" name="Picture 14" descr="http://consultoriajl.com.br/wp-content/uploads/2015/12/usuario.png"/>
+          <p:cNvPicPr>
+            <a:picLocks noChangeAspect="1" noChangeArrowheads="1"/>
+          </p:cNvPicPr>
+          <p:nvPr/>
+        </p:nvPicPr>
+        <p:blipFill>
+          <a:blip r:embed="rId6">
+            <a:extLst>
+              <a:ext uri="{28A0092B-C50C-407E-A947-70E740481C1C}">
+                <a14:useLocalDpi xmlns:a14="http://schemas.microsoft.com/office/drawing/2010/main" val="0"/>
+              </a:ext>
+            </a:extLst>
+          </a:blip>
+          <a:srcRect/>
+          <a:stretch>
+            <a:fillRect/>
+          </a:stretch>
+        </p:blipFill>
+        <p:spPr bwMode="auto">
+          <a:xfrm>
+            <a:off x="2377703" y="5351082"/>
+            <a:ext cx="1340857" cy="1340857"/>
+          </a:xfrm>
+          <a:prstGeom prst="rect">
+            <a:avLst/>
+          </a:prstGeom>
+          <a:noFill/>
+          <a:extLst>
+            <a:ext uri="{909E8E84-426E-40DD-AFC4-6F175D3DCCD1}">
+              <a14:hiddenFill xmlns:a14="http://schemas.microsoft.com/office/drawing/2010/main">
+                <a:solidFill>
+                  <a:srgbClr val="FFFFFF"/>
+                </a:solidFill>
+              </a14:hiddenFill>
+            </a:ext>
+          </a:extLst>
+        </p:spPr>
+      </p:pic>
+      <p:sp>
+        <p:nvSpPr>
+          <p:cNvPr id="10" name="Marcador de Posição de Conteúdo 2"/>
+          <p:cNvSpPr txBox="1">
+            <a:spLocks/>
+          </p:cNvSpPr>
+          <p:nvPr/>
+        </p:nvSpPr>
+        <p:spPr>
+          <a:xfrm>
+            <a:off x="3718560" y="4952417"/>
+            <a:ext cx="8214360" cy="1739521"/>
+          </a:xfrm>
+          <a:prstGeom prst="rect">
+            <a:avLst/>
+          </a:prstGeom>
+        </p:spPr>
+        <p:txBody>
+          <a:bodyPr vert="horz" lIns="91440" tIns="45720" rIns="91440" bIns="45720" rtlCol="0">
+            <a:normAutofit/>
+          </a:bodyPr>
+          <a:lstStyle>
+            <a:lvl1pPr marL="228600" indent="-228600" algn="l" defTabSz="914400" rtl="0" eaLnBrk="1" latinLnBrk="0" hangingPunct="1">
+              <a:lnSpc>
+                <a:spcPct val="90000"/>
+              </a:lnSpc>
+              <a:spcBef>
+                <a:spcPts val="1000"/>
+              </a:spcBef>
+              <a:buFont typeface="Arial" panose="020B0604020202020204" pitchFamily="34" charset="0"/>
+              <a:buChar char="•"/>
+              <a:defRPr sz="2800" kern="1200">
+                <a:solidFill>
+                  <a:schemeClr val="tx1"/>
+                </a:solidFill>
+                <a:latin typeface="+mn-lt"/>
+                <a:ea typeface="+mn-ea"/>
+                <a:cs typeface="+mn-cs"/>
+              </a:defRPr>
+            </a:lvl1pPr>
+            <a:lvl2pPr marL="685800" indent="-228600" algn="l" defTabSz="914400" rtl="0" eaLnBrk="1" latinLnBrk="0" hangingPunct="1">
+              <a:lnSpc>
+                <a:spcPct val="90000"/>
+              </a:lnSpc>
+              <a:spcBef>
+                <a:spcPts val="500"/>
+              </a:spcBef>
+              <a:buFont typeface="Arial" panose="020B0604020202020204" pitchFamily="34" charset="0"/>
+              <a:buChar char="•"/>
+              <a:defRPr sz="2400" kern="1200">
+                <a:solidFill>
+                  <a:schemeClr val="tx1"/>
+                </a:solidFill>
+                <a:latin typeface="+mn-lt"/>
+                <a:ea typeface="+mn-ea"/>
+                <a:cs typeface="+mn-cs"/>
+              </a:defRPr>
+            </a:lvl2pPr>
+            <a:lvl3pPr marL="1143000" indent="-228600" algn="l" defTabSz="914400" rtl="0" eaLnBrk="1" latinLnBrk="0" hangingPunct="1">
+              <a:lnSpc>
+                <a:spcPct val="90000"/>
+              </a:lnSpc>
+              <a:spcBef>
+                <a:spcPts val="500"/>
+              </a:spcBef>
+              <a:buFont typeface="Arial" panose="020B0604020202020204" pitchFamily="34" charset="0"/>
+              <a:buChar char="•"/>
+              <a:defRPr sz="2000" kern="1200">
+                <a:solidFill>
+                  <a:schemeClr val="tx1"/>
+                </a:solidFill>
+                <a:latin typeface="+mn-lt"/>
+                <a:ea typeface="+mn-ea"/>
+                <a:cs typeface="+mn-cs"/>
+              </a:defRPr>
+            </a:lvl3pPr>
+            <a:lvl4pPr marL="1600200" indent="-228600" algn="l" defTabSz="914400" rtl="0" eaLnBrk="1" latinLnBrk="0" hangingPunct="1">
+              <a:lnSpc>
+                <a:spcPct val="90000"/>
+              </a:lnSpc>
+              <a:spcBef>
+                <a:spcPts val="500"/>
+              </a:spcBef>
+              <a:buFont typeface="Arial" panose="020B0604020202020204" pitchFamily="34" charset="0"/>
+              <a:buChar char="•"/>
+              <a:defRPr sz="1800" kern="1200">
+                <a:solidFill>
+                  <a:schemeClr val="tx1"/>
+                </a:solidFill>
+                <a:latin typeface="+mn-lt"/>
+                <a:ea typeface="+mn-ea"/>
+                <a:cs typeface="+mn-cs"/>
+              </a:defRPr>
+            </a:lvl4pPr>
+            <a:lvl5pPr marL="2057400" indent="-228600" algn="l" defTabSz="914400" rtl="0" eaLnBrk="1" latinLnBrk="0" hangingPunct="1">
+              <a:lnSpc>
+                <a:spcPct val="90000"/>
+              </a:lnSpc>
+              <a:spcBef>
+                <a:spcPts val="500"/>
+              </a:spcBef>
+              <a:buFont typeface="Arial" panose="020B0604020202020204" pitchFamily="34" charset="0"/>
+              <a:buChar char="•"/>
+              <a:defRPr sz="1800" kern="1200">
+                <a:solidFill>
+                  <a:schemeClr val="tx1"/>
+                </a:solidFill>
+                <a:latin typeface="+mn-lt"/>
+                <a:ea typeface="+mn-ea"/>
+                <a:cs typeface="+mn-cs"/>
+              </a:defRPr>
+            </a:lvl5pPr>
+            <a:lvl6pPr marL="2514600" indent="-228600" algn="l" defTabSz="914400" rtl="0" eaLnBrk="1" latinLnBrk="0" hangingPunct="1">
+              <a:lnSpc>
+                <a:spcPct val="90000"/>
+              </a:lnSpc>
+              <a:spcBef>
+                <a:spcPts val="500"/>
+              </a:spcBef>
+              <a:buFont typeface="Arial" panose="020B0604020202020204" pitchFamily="34" charset="0"/>
+              <a:buChar char="•"/>
+              <a:defRPr sz="1800" kern="1200">
+                <a:solidFill>
+                  <a:schemeClr val="tx1"/>
+                </a:solidFill>
+                <a:latin typeface="+mn-lt"/>
+                <a:ea typeface="+mn-ea"/>
+                <a:cs typeface="+mn-cs"/>
+              </a:defRPr>
+            </a:lvl6pPr>
+            <a:lvl7pPr marL="2971800" indent="-228600" algn="l" defTabSz="914400" rtl="0" eaLnBrk="1" latinLnBrk="0" hangingPunct="1">
+              <a:lnSpc>
+                <a:spcPct val="90000"/>
+              </a:lnSpc>
+              <a:spcBef>
+                <a:spcPts val="500"/>
+              </a:spcBef>
+              <a:buFont typeface="Arial" panose="020B0604020202020204" pitchFamily="34" charset="0"/>
+              <a:buChar char="•"/>
+              <a:defRPr sz="1800" kern="1200">
+                <a:solidFill>
+                  <a:schemeClr val="tx1"/>
+                </a:solidFill>
+                <a:latin typeface="+mn-lt"/>
+                <a:ea typeface="+mn-ea"/>
+                <a:cs typeface="+mn-cs"/>
+              </a:defRPr>
+            </a:lvl7pPr>
+            <a:lvl8pPr marL="3429000" indent="-228600" algn="l" defTabSz="914400" rtl="0" eaLnBrk="1" latinLnBrk="0" hangingPunct="1">
+              <a:lnSpc>
+                <a:spcPct val="90000"/>
+              </a:lnSpc>
+              <a:spcBef>
+                <a:spcPts val="500"/>
+              </a:spcBef>
+              <a:buFont typeface="Arial" panose="020B0604020202020204" pitchFamily="34" charset="0"/>
+              <a:buChar char="•"/>
+              <a:defRPr sz="1800" kern="1200">
+                <a:solidFill>
+                  <a:schemeClr val="tx1"/>
+                </a:solidFill>
+                <a:latin typeface="+mn-lt"/>
+                <a:ea typeface="+mn-ea"/>
+                <a:cs typeface="+mn-cs"/>
+              </a:defRPr>
+            </a:lvl8pPr>
+            <a:lvl9pPr marL="3886200" indent="-228600" algn="l" defTabSz="914400" rtl="0" eaLnBrk="1" latinLnBrk="0" hangingPunct="1">
+              <a:lnSpc>
+                <a:spcPct val="90000"/>
+              </a:lnSpc>
+              <a:spcBef>
+                <a:spcPts val="500"/>
+              </a:spcBef>
+              <a:buFont typeface="Arial" panose="020B0604020202020204" pitchFamily="34" charset="0"/>
+              <a:buChar char="•"/>
+              <a:defRPr sz="1800" kern="1200">
+                <a:solidFill>
+                  <a:schemeClr val="tx1"/>
+                </a:solidFill>
+                <a:latin typeface="+mn-lt"/>
+                <a:ea typeface="+mn-ea"/>
+                <a:cs typeface="+mn-cs"/>
+              </a:defRPr>
+            </a:lvl9pPr>
+          </a:lstStyle>
+          <a:p>
+            <a:r>
+              <a:rPr lang="pt-PT" dirty="0" smtClean="0"/>
+              <a:t>3. Exemplar = cópia do livro</a:t>
+            </a:r>
+            <a:br>
+              <a:rPr lang="pt-PT" dirty="0" smtClean="0"/>
+            </a:br>
+            <a:r>
+              <a:rPr lang="pt-PT" dirty="0" smtClean="0"/>
+              <a:t>Primeiro tínhamos livro e atributo nº de cópias que seriam decrementadas MAS difícil expressar requisição/reserva de cada um…</a:t>
+            </a:r>
           </a:p>
         </p:txBody>
       </p:sp>
     </p:spTree>
     <p:extLst>
       <p:ext uri="{BB962C8B-B14F-4D97-AF65-F5344CB8AC3E}">
-        <p14:creationId xmlns:p14="http://schemas.microsoft.com/office/powerpoint/2010/main" val="1976290187"/>
+        <p14:creationId xmlns:p14="http://schemas.microsoft.com/office/powerpoint/2010/main" val="2570013343"/>
       </p:ext>
     </p:extLst>
   </p:cSld>
@@ -5422,29 +6030,6 @@
       </p:grpSpPr>
       <p:sp>
         <p:nvSpPr>
-          <p:cNvPr id="2" name="Título 1"/>
-          <p:cNvSpPr>
-            <a:spLocks noGrp="1"/>
-          </p:cNvSpPr>
-          <p:nvPr>
-            <p:ph type="title"/>
-          </p:nvPr>
-        </p:nvSpPr>
-        <p:spPr/>
-        <p:txBody>
-          <a:bodyPr/>
-          <a:lstStyle/>
-          <a:p>
-            <a:r>
-              <a:rPr lang="pt-PT" dirty="0" smtClean="0"/>
-              <a:t>Identificação dos Atributos</a:t>
-            </a:r>
-            <a:endParaRPr lang="en-US" dirty="0"/>
-          </a:p>
-        </p:txBody>
-      </p:sp>
-      <p:sp>
-        <p:nvSpPr>
           <p:cNvPr id="3" name="Marcador de Posição de Conteúdo 2"/>
           <p:cNvSpPr>
             <a:spLocks noGrp="1"/>
@@ -5453,102 +6038,816 @@
             <p:ph idx="1"/>
           </p:nvPr>
         </p:nvSpPr>
-        <p:spPr/>
-        <p:txBody>
-          <a:bodyPr>
+        <p:spPr>
+          <a:xfrm>
+            <a:off x="1736387" y="294996"/>
+            <a:ext cx="10515600" cy="1169330"/>
+          </a:xfrm>
+        </p:spPr>
+        <p:txBody>
+          <a:bodyPr/>
+          <a:lstStyle/>
+          <a:p>
+            <a:r>
+              <a:rPr lang="pt-PT" dirty="0" smtClean="0"/>
+              <a:t>Utilizador = utente da biblioteca: faz consultas sobre o sistema; participa em reservas e requisições; é identificado univocamente.</a:t>
+            </a:r>
+            <a:endParaRPr lang="en-US" dirty="0"/>
+          </a:p>
+        </p:txBody>
+      </p:sp>
+      <p:pic>
+        <p:nvPicPr>
+          <p:cNvPr id="4" name="Picture 14" descr="http://consultoriajl.com.br/wp-content/uploads/2015/12/usuario.png"/>
+          <p:cNvPicPr>
+            <a:picLocks noChangeAspect="1" noChangeArrowheads="1"/>
+          </p:cNvPicPr>
+          <p:nvPr/>
+        </p:nvPicPr>
+        <p:blipFill>
+          <a:blip r:embed="rId2">
+            <a:extLst>
+              <a:ext uri="{28A0092B-C50C-407E-A947-70E740481C1C}">
+                <a14:useLocalDpi xmlns:a14="http://schemas.microsoft.com/office/drawing/2010/main" val="0"/>
+              </a:ext>
+            </a:extLst>
+          </a:blip>
+          <a:srcRect/>
+          <a:stretch>
+            <a:fillRect/>
+          </a:stretch>
+        </p:blipFill>
+        <p:spPr bwMode="auto">
+          <a:xfrm>
+            <a:off x="342458" y="123468"/>
+            <a:ext cx="1340857" cy="1340857"/>
+          </a:xfrm>
+          <a:prstGeom prst="rect">
+            <a:avLst/>
+          </a:prstGeom>
+          <a:noFill/>
+          <a:extLst>
+            <a:ext uri="{909E8E84-426E-40DD-AFC4-6F175D3DCCD1}">
+              <a14:hiddenFill xmlns:a14="http://schemas.microsoft.com/office/drawing/2010/main">
+                <a:solidFill>
+                  <a:srgbClr val="FFFFFF"/>
+                </a:solidFill>
+              </a14:hiddenFill>
+            </a:ext>
+          </a:extLst>
+        </p:spPr>
+      </p:pic>
+      <p:pic>
+        <p:nvPicPr>
+          <p:cNvPr id="5" name="Picture 16" descr="http://www.esenviseu.net/principal/biblioteca/img/1_computador_livros%5B1%5D.gif"/>
+          <p:cNvPicPr>
+            <a:picLocks noChangeAspect="1" noChangeArrowheads="1"/>
+          </p:cNvPicPr>
+          <p:nvPr/>
+        </p:nvPicPr>
+        <p:blipFill>
+          <a:blip r:embed="rId3">
+            <a:extLst>
+              <a:ext uri="{28A0092B-C50C-407E-A947-70E740481C1C}">
+                <a14:useLocalDpi xmlns:a14="http://schemas.microsoft.com/office/drawing/2010/main" val="0"/>
+              </a:ext>
+            </a:extLst>
+          </a:blip>
+          <a:srcRect/>
+          <a:stretch>
+            <a:fillRect/>
+          </a:stretch>
+        </p:blipFill>
+        <p:spPr bwMode="auto">
+          <a:xfrm>
+            <a:off x="415778" y="1610439"/>
+            <a:ext cx="2171700" cy="1933576"/>
+          </a:xfrm>
+          <a:prstGeom prst="rect">
+            <a:avLst/>
+          </a:prstGeom>
+          <a:noFill/>
+          <a:extLst>
+            <a:ext uri="{909E8E84-426E-40DD-AFC4-6F175D3DCCD1}">
+              <a14:hiddenFill xmlns:a14="http://schemas.microsoft.com/office/drawing/2010/main">
+                <a:solidFill>
+                  <a:srgbClr val="FFFFFF"/>
+                </a:solidFill>
+              </a14:hiddenFill>
+            </a:ext>
+          </a:extLst>
+        </p:spPr>
+      </p:pic>
+      <p:sp>
+        <p:nvSpPr>
+          <p:cNvPr id="6" name="Marcador de Posição de Conteúdo 2"/>
+          <p:cNvSpPr txBox="1">
+            <a:spLocks/>
+          </p:cNvSpPr>
+          <p:nvPr/>
+        </p:nvSpPr>
+        <p:spPr>
+          <a:xfrm>
+            <a:off x="2587478" y="1867841"/>
+            <a:ext cx="4962564" cy="1719263"/>
+          </a:xfrm>
+          <a:prstGeom prst="rect">
+            <a:avLst/>
+          </a:prstGeom>
+        </p:spPr>
+        <p:txBody>
+          <a:bodyPr vert="horz" lIns="91440" tIns="45720" rIns="91440" bIns="45720" rtlCol="0">
             <a:normAutofit/>
           </a:bodyPr>
-          <a:lstStyle/>
-          <a:p>
-            <a:pPr marL="514350" indent="-514350">
-              <a:buFont typeface="+mj-lt"/>
-              <a:buAutoNum type="arabicPeriod"/>
-            </a:pPr>
-            <a:r>
-              <a:rPr lang="pt-PT" dirty="0" smtClean="0"/>
-              <a:t>Atributos do Livro</a:t>
-            </a:r>
-          </a:p>
-          <a:p>
-            <a:pPr marL="514350" indent="-514350">
-              <a:buFont typeface="+mj-lt"/>
-              <a:buAutoNum type="arabicPeriod"/>
-            </a:pPr>
-            <a:r>
-              <a:rPr lang="pt-PT" dirty="0" smtClean="0"/>
-              <a:t>Do Autor</a:t>
-            </a:r>
-          </a:p>
-          <a:p>
-            <a:pPr marL="514350" indent="-514350">
-              <a:buFont typeface="+mj-lt"/>
-              <a:buAutoNum type="arabicPeriod"/>
-            </a:pPr>
-            <a:r>
-              <a:rPr lang="pt-PT" dirty="0" smtClean="0"/>
-              <a:t>De Editora</a:t>
-            </a:r>
-          </a:p>
-          <a:p>
-            <a:pPr marL="514350" indent="-514350">
-              <a:buFont typeface="+mj-lt"/>
-              <a:buAutoNum type="arabicPeriod"/>
-            </a:pPr>
-            <a:r>
-              <a:rPr lang="pt-PT" dirty="0" smtClean="0"/>
-              <a:t>De Exemplar</a:t>
-            </a:r>
-          </a:p>
-          <a:p>
-            <a:pPr marL="514350" indent="-514350">
-              <a:buFont typeface="+mj-lt"/>
-              <a:buAutoNum type="arabicPeriod"/>
-            </a:pPr>
-            <a:r>
-              <a:rPr lang="pt-PT" dirty="0" smtClean="0"/>
-              <a:t>De Requisição</a:t>
-            </a:r>
-          </a:p>
-          <a:p>
-            <a:pPr marL="514350" indent="-514350">
-              <a:buFont typeface="+mj-lt"/>
-              <a:buAutoNum type="arabicPeriod"/>
-            </a:pPr>
-            <a:r>
-              <a:rPr lang="pt-PT" dirty="0" smtClean="0"/>
-              <a:t>De Utilizador</a:t>
-            </a:r>
-          </a:p>
-          <a:p>
-            <a:pPr marL="514350" indent="-514350">
-              <a:buFont typeface="+mj-lt"/>
-              <a:buAutoNum type="arabicPeriod"/>
-            </a:pPr>
-            <a:r>
-              <a:rPr lang="pt-PT" dirty="0" smtClean="0"/>
-              <a:t>De Localização</a:t>
-            </a:r>
-          </a:p>
-          <a:p>
-            <a:pPr marL="514350" indent="-514350">
-              <a:buFont typeface="+mj-lt"/>
-              <a:buAutoNum type="arabicPeriod"/>
-            </a:pPr>
-            <a:r>
-              <a:rPr lang="pt-PT" dirty="0" smtClean="0"/>
-              <a:t>De Coleç</a:t>
-            </a:r>
-            <a:r>
-              <a:rPr lang="en-US" dirty="0" smtClean="0"/>
-              <a:t>ão</a:t>
-            </a:r>
+          <a:lstStyle>
+            <a:lvl1pPr marL="228600" indent="-228600" algn="l" defTabSz="914400" rtl="0" eaLnBrk="1" latinLnBrk="0" hangingPunct="1">
+              <a:lnSpc>
+                <a:spcPct val="90000"/>
+              </a:lnSpc>
+              <a:spcBef>
+                <a:spcPts val="1000"/>
+              </a:spcBef>
+              <a:buFont typeface="Arial" panose="020B0604020202020204" pitchFamily="34" charset="0"/>
+              <a:buChar char="•"/>
+              <a:defRPr sz="2800" kern="1200">
+                <a:solidFill>
+                  <a:schemeClr val="tx1"/>
+                </a:solidFill>
+                <a:latin typeface="+mn-lt"/>
+                <a:ea typeface="+mn-ea"/>
+                <a:cs typeface="+mn-cs"/>
+              </a:defRPr>
+            </a:lvl1pPr>
+            <a:lvl2pPr marL="685800" indent="-228600" algn="l" defTabSz="914400" rtl="0" eaLnBrk="1" latinLnBrk="0" hangingPunct="1">
+              <a:lnSpc>
+                <a:spcPct val="90000"/>
+              </a:lnSpc>
+              <a:spcBef>
+                <a:spcPts val="500"/>
+              </a:spcBef>
+              <a:buFont typeface="Arial" panose="020B0604020202020204" pitchFamily="34" charset="0"/>
+              <a:buChar char="•"/>
+              <a:defRPr sz="2400" kern="1200">
+                <a:solidFill>
+                  <a:schemeClr val="tx1"/>
+                </a:solidFill>
+                <a:latin typeface="+mn-lt"/>
+                <a:ea typeface="+mn-ea"/>
+                <a:cs typeface="+mn-cs"/>
+              </a:defRPr>
+            </a:lvl2pPr>
+            <a:lvl3pPr marL="1143000" indent="-228600" algn="l" defTabSz="914400" rtl="0" eaLnBrk="1" latinLnBrk="0" hangingPunct="1">
+              <a:lnSpc>
+                <a:spcPct val="90000"/>
+              </a:lnSpc>
+              <a:spcBef>
+                <a:spcPts val="500"/>
+              </a:spcBef>
+              <a:buFont typeface="Arial" panose="020B0604020202020204" pitchFamily="34" charset="0"/>
+              <a:buChar char="•"/>
+              <a:defRPr sz="2000" kern="1200">
+                <a:solidFill>
+                  <a:schemeClr val="tx1"/>
+                </a:solidFill>
+                <a:latin typeface="+mn-lt"/>
+                <a:ea typeface="+mn-ea"/>
+                <a:cs typeface="+mn-cs"/>
+              </a:defRPr>
+            </a:lvl3pPr>
+            <a:lvl4pPr marL="1600200" indent="-228600" algn="l" defTabSz="914400" rtl="0" eaLnBrk="1" latinLnBrk="0" hangingPunct="1">
+              <a:lnSpc>
+                <a:spcPct val="90000"/>
+              </a:lnSpc>
+              <a:spcBef>
+                <a:spcPts val="500"/>
+              </a:spcBef>
+              <a:buFont typeface="Arial" panose="020B0604020202020204" pitchFamily="34" charset="0"/>
+              <a:buChar char="•"/>
+              <a:defRPr sz="1800" kern="1200">
+                <a:solidFill>
+                  <a:schemeClr val="tx1"/>
+                </a:solidFill>
+                <a:latin typeface="+mn-lt"/>
+                <a:ea typeface="+mn-ea"/>
+                <a:cs typeface="+mn-cs"/>
+              </a:defRPr>
+            </a:lvl4pPr>
+            <a:lvl5pPr marL="2057400" indent="-228600" algn="l" defTabSz="914400" rtl="0" eaLnBrk="1" latinLnBrk="0" hangingPunct="1">
+              <a:lnSpc>
+                <a:spcPct val="90000"/>
+              </a:lnSpc>
+              <a:spcBef>
+                <a:spcPts val="500"/>
+              </a:spcBef>
+              <a:buFont typeface="Arial" panose="020B0604020202020204" pitchFamily="34" charset="0"/>
+              <a:buChar char="•"/>
+              <a:defRPr sz="1800" kern="1200">
+                <a:solidFill>
+                  <a:schemeClr val="tx1"/>
+                </a:solidFill>
+                <a:latin typeface="+mn-lt"/>
+                <a:ea typeface="+mn-ea"/>
+                <a:cs typeface="+mn-cs"/>
+              </a:defRPr>
+            </a:lvl5pPr>
+            <a:lvl6pPr marL="2514600" indent="-228600" algn="l" defTabSz="914400" rtl="0" eaLnBrk="1" latinLnBrk="0" hangingPunct="1">
+              <a:lnSpc>
+                <a:spcPct val="90000"/>
+              </a:lnSpc>
+              <a:spcBef>
+                <a:spcPts val="500"/>
+              </a:spcBef>
+              <a:buFont typeface="Arial" panose="020B0604020202020204" pitchFamily="34" charset="0"/>
+              <a:buChar char="•"/>
+              <a:defRPr sz="1800" kern="1200">
+                <a:solidFill>
+                  <a:schemeClr val="tx1"/>
+                </a:solidFill>
+                <a:latin typeface="+mn-lt"/>
+                <a:ea typeface="+mn-ea"/>
+                <a:cs typeface="+mn-cs"/>
+              </a:defRPr>
+            </a:lvl6pPr>
+            <a:lvl7pPr marL="2971800" indent="-228600" algn="l" defTabSz="914400" rtl="0" eaLnBrk="1" latinLnBrk="0" hangingPunct="1">
+              <a:lnSpc>
+                <a:spcPct val="90000"/>
+              </a:lnSpc>
+              <a:spcBef>
+                <a:spcPts val="500"/>
+              </a:spcBef>
+              <a:buFont typeface="Arial" panose="020B0604020202020204" pitchFamily="34" charset="0"/>
+              <a:buChar char="•"/>
+              <a:defRPr sz="1800" kern="1200">
+                <a:solidFill>
+                  <a:schemeClr val="tx1"/>
+                </a:solidFill>
+                <a:latin typeface="+mn-lt"/>
+                <a:ea typeface="+mn-ea"/>
+                <a:cs typeface="+mn-cs"/>
+              </a:defRPr>
+            </a:lvl7pPr>
+            <a:lvl8pPr marL="3429000" indent="-228600" algn="l" defTabSz="914400" rtl="0" eaLnBrk="1" latinLnBrk="0" hangingPunct="1">
+              <a:lnSpc>
+                <a:spcPct val="90000"/>
+              </a:lnSpc>
+              <a:spcBef>
+                <a:spcPts val="500"/>
+              </a:spcBef>
+              <a:buFont typeface="Arial" panose="020B0604020202020204" pitchFamily="34" charset="0"/>
+              <a:buChar char="•"/>
+              <a:defRPr sz="1800" kern="1200">
+                <a:solidFill>
+                  <a:schemeClr val="tx1"/>
+                </a:solidFill>
+                <a:latin typeface="+mn-lt"/>
+                <a:ea typeface="+mn-ea"/>
+                <a:cs typeface="+mn-cs"/>
+              </a:defRPr>
+            </a:lvl8pPr>
+            <a:lvl9pPr marL="3886200" indent="-228600" algn="l" defTabSz="914400" rtl="0" eaLnBrk="1" latinLnBrk="0" hangingPunct="1">
+              <a:lnSpc>
+                <a:spcPct val="90000"/>
+              </a:lnSpc>
+              <a:spcBef>
+                <a:spcPts val="500"/>
+              </a:spcBef>
+              <a:buFont typeface="Arial" panose="020B0604020202020204" pitchFamily="34" charset="0"/>
+              <a:buChar char="•"/>
+              <a:defRPr sz="1800" kern="1200">
+                <a:solidFill>
+                  <a:schemeClr val="tx1"/>
+                </a:solidFill>
+                <a:latin typeface="+mn-lt"/>
+                <a:ea typeface="+mn-ea"/>
+                <a:cs typeface="+mn-cs"/>
+              </a:defRPr>
+            </a:lvl9pPr>
+          </a:lstStyle>
+          <a:p>
+            <a:r>
+              <a:rPr lang="pt-PT" dirty="0" smtClean="0"/>
+              <a:t>Requisições: estado próprio associado + identificador único -&gt; ENTIDADE</a:t>
+            </a:r>
+            <a:endParaRPr lang="en-US" dirty="0"/>
+          </a:p>
+        </p:txBody>
+      </p:sp>
+      <p:pic>
+        <p:nvPicPr>
+          <p:cNvPr id="7" name="Picture 28" descr="http://www.depoisdosquinze.com/wp-content/uploads/2014/03/estante-de-livros-brunavieira.jpg"/>
+          <p:cNvPicPr>
+            <a:picLocks noChangeAspect="1" noChangeArrowheads="1"/>
+          </p:cNvPicPr>
+          <p:nvPr/>
+        </p:nvPicPr>
+        <p:blipFill>
+          <a:blip r:embed="rId4" cstate="print">
+            <a:extLst>
+              <a:ext uri="{28A0092B-C50C-407E-A947-70E740481C1C}">
+                <a14:useLocalDpi xmlns:a14="http://schemas.microsoft.com/office/drawing/2010/main" val="0"/>
+              </a:ext>
+            </a:extLst>
+          </a:blip>
+          <a:srcRect/>
+          <a:stretch>
+            <a:fillRect/>
+          </a:stretch>
+        </p:blipFill>
+        <p:spPr bwMode="auto">
+          <a:xfrm>
+            <a:off x="-279421" y="4345713"/>
+            <a:ext cx="2866899" cy="1912631"/>
+          </a:xfrm>
+          <a:prstGeom prst="ellipse">
+            <a:avLst/>
+          </a:prstGeom>
+          <a:ln>
+            <a:noFill/>
+          </a:ln>
+          <a:effectLst>
+            <a:softEdge rad="112500"/>
+          </a:effectLst>
+          <a:extLst>
+            <a:ext uri="{909E8E84-426E-40DD-AFC4-6F175D3DCCD1}">
+              <a14:hiddenFill xmlns:a14="http://schemas.microsoft.com/office/drawing/2010/main">
+                <a:solidFill>
+                  <a:srgbClr val="FFFFFF"/>
+                </a:solidFill>
+              </a14:hiddenFill>
+            </a:ext>
+          </a:extLst>
+        </p:spPr>
+      </p:pic>
+      <p:sp>
+        <p:nvSpPr>
+          <p:cNvPr id="8" name="Marcador de Posição de Conteúdo 2"/>
+          <p:cNvSpPr txBox="1">
+            <a:spLocks/>
+          </p:cNvSpPr>
+          <p:nvPr/>
+        </p:nvSpPr>
+        <p:spPr>
+          <a:xfrm>
+            <a:off x="2247986" y="4409400"/>
+            <a:ext cx="8813419" cy="2097194"/>
+          </a:xfrm>
+          <a:prstGeom prst="rect">
+            <a:avLst/>
+          </a:prstGeom>
+        </p:spPr>
+        <p:txBody>
+          <a:bodyPr vert="horz" lIns="91440" tIns="45720" rIns="91440" bIns="45720" rtlCol="0">
+            <a:noAutofit/>
+          </a:bodyPr>
+          <a:lstStyle>
+            <a:lvl1pPr marL="228600" indent="-228600" algn="l" defTabSz="914400" rtl="0" eaLnBrk="1" latinLnBrk="0" hangingPunct="1">
+              <a:lnSpc>
+                <a:spcPct val="90000"/>
+              </a:lnSpc>
+              <a:spcBef>
+                <a:spcPts val="1000"/>
+              </a:spcBef>
+              <a:buFont typeface="Arial" panose="020B0604020202020204" pitchFamily="34" charset="0"/>
+              <a:buChar char="•"/>
+              <a:defRPr sz="2800" kern="1200">
+                <a:solidFill>
+                  <a:schemeClr val="tx1"/>
+                </a:solidFill>
+                <a:latin typeface="+mn-lt"/>
+                <a:ea typeface="+mn-ea"/>
+                <a:cs typeface="+mn-cs"/>
+              </a:defRPr>
+            </a:lvl1pPr>
+            <a:lvl2pPr marL="685800" indent="-228600" algn="l" defTabSz="914400" rtl="0" eaLnBrk="1" latinLnBrk="0" hangingPunct="1">
+              <a:lnSpc>
+                <a:spcPct val="90000"/>
+              </a:lnSpc>
+              <a:spcBef>
+                <a:spcPts val="500"/>
+              </a:spcBef>
+              <a:buFont typeface="Arial" panose="020B0604020202020204" pitchFamily="34" charset="0"/>
+              <a:buChar char="•"/>
+              <a:defRPr sz="2400" kern="1200">
+                <a:solidFill>
+                  <a:schemeClr val="tx1"/>
+                </a:solidFill>
+                <a:latin typeface="+mn-lt"/>
+                <a:ea typeface="+mn-ea"/>
+                <a:cs typeface="+mn-cs"/>
+              </a:defRPr>
+            </a:lvl2pPr>
+            <a:lvl3pPr marL="1143000" indent="-228600" algn="l" defTabSz="914400" rtl="0" eaLnBrk="1" latinLnBrk="0" hangingPunct="1">
+              <a:lnSpc>
+                <a:spcPct val="90000"/>
+              </a:lnSpc>
+              <a:spcBef>
+                <a:spcPts val="500"/>
+              </a:spcBef>
+              <a:buFont typeface="Arial" panose="020B0604020202020204" pitchFamily="34" charset="0"/>
+              <a:buChar char="•"/>
+              <a:defRPr sz="2000" kern="1200">
+                <a:solidFill>
+                  <a:schemeClr val="tx1"/>
+                </a:solidFill>
+                <a:latin typeface="+mn-lt"/>
+                <a:ea typeface="+mn-ea"/>
+                <a:cs typeface="+mn-cs"/>
+              </a:defRPr>
+            </a:lvl3pPr>
+            <a:lvl4pPr marL="1600200" indent="-228600" algn="l" defTabSz="914400" rtl="0" eaLnBrk="1" latinLnBrk="0" hangingPunct="1">
+              <a:lnSpc>
+                <a:spcPct val="90000"/>
+              </a:lnSpc>
+              <a:spcBef>
+                <a:spcPts val="500"/>
+              </a:spcBef>
+              <a:buFont typeface="Arial" panose="020B0604020202020204" pitchFamily="34" charset="0"/>
+              <a:buChar char="•"/>
+              <a:defRPr sz="1800" kern="1200">
+                <a:solidFill>
+                  <a:schemeClr val="tx1"/>
+                </a:solidFill>
+                <a:latin typeface="+mn-lt"/>
+                <a:ea typeface="+mn-ea"/>
+                <a:cs typeface="+mn-cs"/>
+              </a:defRPr>
+            </a:lvl4pPr>
+            <a:lvl5pPr marL="2057400" indent="-228600" algn="l" defTabSz="914400" rtl="0" eaLnBrk="1" latinLnBrk="0" hangingPunct="1">
+              <a:lnSpc>
+                <a:spcPct val="90000"/>
+              </a:lnSpc>
+              <a:spcBef>
+                <a:spcPts val="500"/>
+              </a:spcBef>
+              <a:buFont typeface="Arial" panose="020B0604020202020204" pitchFamily="34" charset="0"/>
+              <a:buChar char="•"/>
+              <a:defRPr sz="1800" kern="1200">
+                <a:solidFill>
+                  <a:schemeClr val="tx1"/>
+                </a:solidFill>
+                <a:latin typeface="+mn-lt"/>
+                <a:ea typeface="+mn-ea"/>
+                <a:cs typeface="+mn-cs"/>
+              </a:defRPr>
+            </a:lvl5pPr>
+            <a:lvl6pPr marL="2514600" indent="-228600" algn="l" defTabSz="914400" rtl="0" eaLnBrk="1" latinLnBrk="0" hangingPunct="1">
+              <a:lnSpc>
+                <a:spcPct val="90000"/>
+              </a:lnSpc>
+              <a:spcBef>
+                <a:spcPts val="500"/>
+              </a:spcBef>
+              <a:buFont typeface="Arial" panose="020B0604020202020204" pitchFamily="34" charset="0"/>
+              <a:buChar char="•"/>
+              <a:defRPr sz="1800" kern="1200">
+                <a:solidFill>
+                  <a:schemeClr val="tx1"/>
+                </a:solidFill>
+                <a:latin typeface="+mn-lt"/>
+                <a:ea typeface="+mn-ea"/>
+                <a:cs typeface="+mn-cs"/>
+              </a:defRPr>
+            </a:lvl6pPr>
+            <a:lvl7pPr marL="2971800" indent="-228600" algn="l" defTabSz="914400" rtl="0" eaLnBrk="1" latinLnBrk="0" hangingPunct="1">
+              <a:lnSpc>
+                <a:spcPct val="90000"/>
+              </a:lnSpc>
+              <a:spcBef>
+                <a:spcPts val="500"/>
+              </a:spcBef>
+              <a:buFont typeface="Arial" panose="020B0604020202020204" pitchFamily="34" charset="0"/>
+              <a:buChar char="•"/>
+              <a:defRPr sz="1800" kern="1200">
+                <a:solidFill>
+                  <a:schemeClr val="tx1"/>
+                </a:solidFill>
+                <a:latin typeface="+mn-lt"/>
+                <a:ea typeface="+mn-ea"/>
+                <a:cs typeface="+mn-cs"/>
+              </a:defRPr>
+            </a:lvl7pPr>
+            <a:lvl8pPr marL="3429000" indent="-228600" algn="l" defTabSz="914400" rtl="0" eaLnBrk="1" latinLnBrk="0" hangingPunct="1">
+              <a:lnSpc>
+                <a:spcPct val="90000"/>
+              </a:lnSpc>
+              <a:spcBef>
+                <a:spcPts val="500"/>
+              </a:spcBef>
+              <a:buFont typeface="Arial" panose="020B0604020202020204" pitchFamily="34" charset="0"/>
+              <a:buChar char="•"/>
+              <a:defRPr sz="1800" kern="1200">
+                <a:solidFill>
+                  <a:schemeClr val="tx1"/>
+                </a:solidFill>
+                <a:latin typeface="+mn-lt"/>
+                <a:ea typeface="+mn-ea"/>
+                <a:cs typeface="+mn-cs"/>
+              </a:defRPr>
+            </a:lvl8pPr>
+            <a:lvl9pPr marL="3886200" indent="-228600" algn="l" defTabSz="914400" rtl="0" eaLnBrk="1" latinLnBrk="0" hangingPunct="1">
+              <a:lnSpc>
+                <a:spcPct val="90000"/>
+              </a:lnSpc>
+              <a:spcBef>
+                <a:spcPts val="500"/>
+              </a:spcBef>
+              <a:buFont typeface="Arial" panose="020B0604020202020204" pitchFamily="34" charset="0"/>
+              <a:buChar char="•"/>
+              <a:defRPr sz="1800" kern="1200">
+                <a:solidFill>
+                  <a:schemeClr val="tx1"/>
+                </a:solidFill>
+                <a:latin typeface="+mn-lt"/>
+                <a:ea typeface="+mn-ea"/>
+                <a:cs typeface="+mn-cs"/>
+              </a:defRPr>
+            </a:lvl9pPr>
+          </a:lstStyle>
+          <a:p>
+            <a:r>
+              <a:rPr lang="pt-PT" dirty="0" smtClean="0"/>
+              <a:t>Localização: onde está o exemplar? </a:t>
+            </a:r>
+            <a:br>
+              <a:rPr lang="pt-PT" dirty="0" smtClean="0"/>
+            </a:br>
+            <a:r>
+              <a:rPr lang="pt-PT" dirty="0" smtClean="0"/>
+              <a:t>Piso? Estante? Prateleira?  </a:t>
+            </a:r>
+            <a:br>
+              <a:rPr lang="pt-PT" dirty="0" smtClean="0"/>
+            </a:br>
+            <a:r>
+              <a:rPr lang="pt-PT" dirty="0" smtClean="0"/>
+              <a:t>Funcionarias + leitores   </a:t>
+            </a:r>
+            <a:br>
+              <a:rPr lang="pt-PT" dirty="0" smtClean="0"/>
+            </a:br>
+            <a:r>
+              <a:rPr lang="pt-PT" dirty="0" smtClean="0"/>
+              <a:t>Podia ser atributo mas é ENTIDADE para evitar redundâncias</a:t>
+            </a:r>
+            <a:endParaRPr lang="en-US" dirty="0"/>
+          </a:p>
+        </p:txBody>
+      </p:sp>
+      <p:pic>
+        <p:nvPicPr>
+          <p:cNvPr id="9" name="Picture 26" descr="http://mlb-s2-p.mlstatic.com/fundamentos-da-matematica-elementar-70-livros-frete-gratis-285001-MLB20252774318_022015-O.jpg"/>
+          <p:cNvPicPr>
+            <a:picLocks noChangeAspect="1" noChangeArrowheads="1"/>
+          </p:cNvPicPr>
+          <p:nvPr/>
+        </p:nvPicPr>
+        <p:blipFill>
+          <a:blip r:embed="rId5">
+            <a:extLst>
+              <a:ext uri="{28A0092B-C50C-407E-A947-70E740481C1C}">
+                <a14:useLocalDpi xmlns:a14="http://schemas.microsoft.com/office/drawing/2010/main" val="0"/>
+              </a:ext>
+            </a:extLst>
+          </a:blip>
+          <a:srcRect/>
+          <a:stretch>
+            <a:fillRect/>
+          </a:stretch>
+        </p:blipFill>
+        <p:spPr bwMode="auto">
+          <a:xfrm>
+            <a:off x="8177631" y="1464325"/>
+            <a:ext cx="2493862" cy="1860421"/>
+          </a:xfrm>
+          <a:prstGeom prst="rect">
+            <a:avLst/>
+          </a:prstGeom>
+          <a:ln>
+            <a:noFill/>
+          </a:ln>
+          <a:effectLst>
+            <a:outerShdw blurRad="292100" dist="139700" dir="2700000" algn="tl" rotWithShape="0">
+              <a:srgbClr val="333333">
+                <a:alpha val="65000"/>
+              </a:srgbClr>
+            </a:outerShdw>
+          </a:effectLst>
+          <a:extLst>
+            <a:ext uri="{909E8E84-426E-40DD-AFC4-6F175D3DCCD1}">
+              <a14:hiddenFill xmlns:a14="http://schemas.microsoft.com/office/drawing/2010/main">
+                <a:solidFill>
+                  <a:srgbClr val="FFFFFF"/>
+                </a:solidFill>
+              </a14:hiddenFill>
+            </a:ext>
+          </a:extLst>
+        </p:spPr>
+      </p:pic>
+      <p:sp>
+        <p:nvSpPr>
+          <p:cNvPr id="10" name="Marcador de Posição de Conteúdo 2"/>
+          <p:cNvSpPr txBox="1">
+            <a:spLocks/>
+          </p:cNvSpPr>
+          <p:nvPr/>
+        </p:nvSpPr>
+        <p:spPr>
+          <a:xfrm>
+            <a:off x="7861489" y="3339273"/>
+            <a:ext cx="4094291" cy="1719263"/>
+          </a:xfrm>
+          <a:prstGeom prst="rect">
+            <a:avLst/>
+          </a:prstGeom>
+        </p:spPr>
+        <p:txBody>
+          <a:bodyPr vert="horz" lIns="91440" tIns="45720" rIns="91440" bIns="45720" rtlCol="0">
+            <a:normAutofit/>
+          </a:bodyPr>
+          <a:lstStyle>
+            <a:lvl1pPr marL="228600" indent="-228600" algn="l" defTabSz="914400" rtl="0" eaLnBrk="1" latinLnBrk="0" hangingPunct="1">
+              <a:lnSpc>
+                <a:spcPct val="90000"/>
+              </a:lnSpc>
+              <a:spcBef>
+                <a:spcPts val="1000"/>
+              </a:spcBef>
+              <a:buFont typeface="Arial" panose="020B0604020202020204" pitchFamily="34" charset="0"/>
+              <a:buChar char="•"/>
+              <a:defRPr sz="2800" kern="1200">
+                <a:solidFill>
+                  <a:schemeClr val="tx1"/>
+                </a:solidFill>
+                <a:latin typeface="+mn-lt"/>
+                <a:ea typeface="+mn-ea"/>
+                <a:cs typeface="+mn-cs"/>
+              </a:defRPr>
+            </a:lvl1pPr>
+            <a:lvl2pPr marL="685800" indent="-228600" algn="l" defTabSz="914400" rtl="0" eaLnBrk="1" latinLnBrk="0" hangingPunct="1">
+              <a:lnSpc>
+                <a:spcPct val="90000"/>
+              </a:lnSpc>
+              <a:spcBef>
+                <a:spcPts val="500"/>
+              </a:spcBef>
+              <a:buFont typeface="Arial" panose="020B0604020202020204" pitchFamily="34" charset="0"/>
+              <a:buChar char="•"/>
+              <a:defRPr sz="2400" kern="1200">
+                <a:solidFill>
+                  <a:schemeClr val="tx1"/>
+                </a:solidFill>
+                <a:latin typeface="+mn-lt"/>
+                <a:ea typeface="+mn-ea"/>
+                <a:cs typeface="+mn-cs"/>
+              </a:defRPr>
+            </a:lvl2pPr>
+            <a:lvl3pPr marL="1143000" indent="-228600" algn="l" defTabSz="914400" rtl="0" eaLnBrk="1" latinLnBrk="0" hangingPunct="1">
+              <a:lnSpc>
+                <a:spcPct val="90000"/>
+              </a:lnSpc>
+              <a:spcBef>
+                <a:spcPts val="500"/>
+              </a:spcBef>
+              <a:buFont typeface="Arial" panose="020B0604020202020204" pitchFamily="34" charset="0"/>
+              <a:buChar char="•"/>
+              <a:defRPr sz="2000" kern="1200">
+                <a:solidFill>
+                  <a:schemeClr val="tx1"/>
+                </a:solidFill>
+                <a:latin typeface="+mn-lt"/>
+                <a:ea typeface="+mn-ea"/>
+                <a:cs typeface="+mn-cs"/>
+              </a:defRPr>
+            </a:lvl3pPr>
+            <a:lvl4pPr marL="1600200" indent="-228600" algn="l" defTabSz="914400" rtl="0" eaLnBrk="1" latinLnBrk="0" hangingPunct="1">
+              <a:lnSpc>
+                <a:spcPct val="90000"/>
+              </a:lnSpc>
+              <a:spcBef>
+                <a:spcPts val="500"/>
+              </a:spcBef>
+              <a:buFont typeface="Arial" panose="020B0604020202020204" pitchFamily="34" charset="0"/>
+              <a:buChar char="•"/>
+              <a:defRPr sz="1800" kern="1200">
+                <a:solidFill>
+                  <a:schemeClr val="tx1"/>
+                </a:solidFill>
+                <a:latin typeface="+mn-lt"/>
+                <a:ea typeface="+mn-ea"/>
+                <a:cs typeface="+mn-cs"/>
+              </a:defRPr>
+            </a:lvl4pPr>
+            <a:lvl5pPr marL="2057400" indent="-228600" algn="l" defTabSz="914400" rtl="0" eaLnBrk="1" latinLnBrk="0" hangingPunct="1">
+              <a:lnSpc>
+                <a:spcPct val="90000"/>
+              </a:lnSpc>
+              <a:spcBef>
+                <a:spcPts val="500"/>
+              </a:spcBef>
+              <a:buFont typeface="Arial" panose="020B0604020202020204" pitchFamily="34" charset="0"/>
+              <a:buChar char="•"/>
+              <a:defRPr sz="1800" kern="1200">
+                <a:solidFill>
+                  <a:schemeClr val="tx1"/>
+                </a:solidFill>
+                <a:latin typeface="+mn-lt"/>
+                <a:ea typeface="+mn-ea"/>
+                <a:cs typeface="+mn-cs"/>
+              </a:defRPr>
+            </a:lvl5pPr>
+            <a:lvl6pPr marL="2514600" indent="-228600" algn="l" defTabSz="914400" rtl="0" eaLnBrk="1" latinLnBrk="0" hangingPunct="1">
+              <a:lnSpc>
+                <a:spcPct val="90000"/>
+              </a:lnSpc>
+              <a:spcBef>
+                <a:spcPts val="500"/>
+              </a:spcBef>
+              <a:buFont typeface="Arial" panose="020B0604020202020204" pitchFamily="34" charset="0"/>
+              <a:buChar char="•"/>
+              <a:defRPr sz="1800" kern="1200">
+                <a:solidFill>
+                  <a:schemeClr val="tx1"/>
+                </a:solidFill>
+                <a:latin typeface="+mn-lt"/>
+                <a:ea typeface="+mn-ea"/>
+                <a:cs typeface="+mn-cs"/>
+              </a:defRPr>
+            </a:lvl6pPr>
+            <a:lvl7pPr marL="2971800" indent="-228600" algn="l" defTabSz="914400" rtl="0" eaLnBrk="1" latinLnBrk="0" hangingPunct="1">
+              <a:lnSpc>
+                <a:spcPct val="90000"/>
+              </a:lnSpc>
+              <a:spcBef>
+                <a:spcPts val="500"/>
+              </a:spcBef>
+              <a:buFont typeface="Arial" panose="020B0604020202020204" pitchFamily="34" charset="0"/>
+              <a:buChar char="•"/>
+              <a:defRPr sz="1800" kern="1200">
+                <a:solidFill>
+                  <a:schemeClr val="tx1"/>
+                </a:solidFill>
+                <a:latin typeface="+mn-lt"/>
+                <a:ea typeface="+mn-ea"/>
+                <a:cs typeface="+mn-cs"/>
+              </a:defRPr>
+            </a:lvl7pPr>
+            <a:lvl8pPr marL="3429000" indent="-228600" algn="l" defTabSz="914400" rtl="0" eaLnBrk="1" latinLnBrk="0" hangingPunct="1">
+              <a:lnSpc>
+                <a:spcPct val="90000"/>
+              </a:lnSpc>
+              <a:spcBef>
+                <a:spcPts val="500"/>
+              </a:spcBef>
+              <a:buFont typeface="Arial" panose="020B0604020202020204" pitchFamily="34" charset="0"/>
+              <a:buChar char="•"/>
+              <a:defRPr sz="1800" kern="1200">
+                <a:solidFill>
+                  <a:schemeClr val="tx1"/>
+                </a:solidFill>
+                <a:latin typeface="+mn-lt"/>
+                <a:ea typeface="+mn-ea"/>
+                <a:cs typeface="+mn-cs"/>
+              </a:defRPr>
+            </a:lvl8pPr>
+            <a:lvl9pPr marL="3886200" indent="-228600" algn="l" defTabSz="914400" rtl="0" eaLnBrk="1" latinLnBrk="0" hangingPunct="1">
+              <a:lnSpc>
+                <a:spcPct val="90000"/>
+              </a:lnSpc>
+              <a:spcBef>
+                <a:spcPts val="500"/>
+              </a:spcBef>
+              <a:buFont typeface="Arial" panose="020B0604020202020204" pitchFamily="34" charset="0"/>
+              <a:buChar char="•"/>
+              <a:defRPr sz="1800" kern="1200">
+                <a:solidFill>
+                  <a:schemeClr val="tx1"/>
+                </a:solidFill>
+                <a:latin typeface="+mn-lt"/>
+                <a:ea typeface="+mn-ea"/>
+                <a:cs typeface="+mn-cs"/>
+              </a:defRPr>
+            </a:lvl9pPr>
+          </a:lstStyle>
+          <a:p>
+            <a:r>
+              <a:rPr lang="pt-PT" dirty="0" smtClean="0"/>
+              <a:t>Coleção: conjunto de livros;</a:t>
+            </a:r>
+            <a:br>
+              <a:rPr lang="pt-PT" dirty="0" smtClean="0"/>
+            </a:br>
+            <a:r>
+              <a:rPr lang="pt-PT" dirty="0" smtClean="0"/>
+              <a:t>Entidade pois coleção = vários livros</a:t>
+            </a:r>
+            <a:endParaRPr lang="en-US" dirty="0"/>
           </a:p>
         </p:txBody>
       </p:sp>
     </p:spTree>
     <p:extLst>
       <p:ext uri="{BB962C8B-B14F-4D97-AF65-F5344CB8AC3E}">
-        <p14:creationId xmlns:p14="http://schemas.microsoft.com/office/powerpoint/2010/main" val="3081524983"/>
+        <p14:creationId xmlns:p14="http://schemas.microsoft.com/office/powerpoint/2010/main" val="2895425075"/>
       </p:ext>
     </p:extLst>
   </p:cSld>
@@ -5590,16 +6889,11 @@
           <a:bodyPr/>
           <a:lstStyle/>
           <a:p>
-            <a:pPr>
-              <a:lnSpc>
-                <a:spcPct val="150000"/>
-              </a:lnSpc>
-            </a:pPr>
-            <a:r>
-              <a:rPr lang="pt-PT" dirty="0" smtClean="0"/>
-              <a:t>Identificação das Chaves</a:t>
-            </a:r>
-            <a:endParaRPr lang="pt-PT" dirty="0" smtClean="0"/>
+            <a:r>
+              <a:rPr lang="pt-PT" dirty="0" smtClean="0"/>
+              <a:t>Identificação dos Relacionamentos</a:t>
+            </a:r>
+            <a:endParaRPr lang="en-US" dirty="0"/>
           </a:p>
         </p:txBody>
       </p:sp>
@@ -5624,7 +6918,7 @@
             </a:pPr>
             <a:r>
               <a:rPr lang="pt-PT" dirty="0" smtClean="0"/>
-              <a:t>Livro</a:t>
+              <a:t>Livro-Autor</a:t>
             </a:r>
           </a:p>
           <a:p>
@@ -5634,7 +6928,7 @@
             </a:pPr>
             <a:r>
               <a:rPr lang="pt-PT" dirty="0" smtClean="0"/>
-              <a:t>Autor</a:t>
+              <a:t>Livro-Editora</a:t>
             </a:r>
           </a:p>
           <a:p>
@@ -5644,7 +6938,7 @@
             </a:pPr>
             <a:r>
               <a:rPr lang="pt-PT" dirty="0" smtClean="0"/>
-              <a:t>Editora</a:t>
+              <a:t>Livro-Exemplar</a:t>
             </a:r>
           </a:p>
           <a:p>
@@ -5654,7 +6948,7 @@
             </a:pPr>
             <a:r>
               <a:rPr lang="pt-PT" dirty="0" smtClean="0"/>
-              <a:t>Exemplar</a:t>
+              <a:t>Exemplar-Requisição</a:t>
             </a:r>
           </a:p>
           <a:p>
@@ -5664,7 +6958,7 @@
             </a:pPr>
             <a:r>
               <a:rPr lang="pt-PT" dirty="0" smtClean="0"/>
-              <a:t>Requisição</a:t>
+              <a:t>Exemplar-Utilizador</a:t>
             </a:r>
           </a:p>
           <a:p>
@@ -5674,7 +6968,7 @@
             </a:pPr>
             <a:r>
               <a:rPr lang="pt-PT" dirty="0" smtClean="0"/>
-              <a:t>Localização</a:t>
+              <a:t>Exemplar-Localização</a:t>
             </a:r>
           </a:p>
           <a:p>
@@ -5684,7 +6978,7 @@
             </a:pPr>
             <a:r>
               <a:rPr lang="pt-PT" dirty="0" smtClean="0"/>
-              <a:t>Utilizador</a:t>
+              <a:t>Requisição-Utilizador</a:t>
             </a:r>
           </a:p>
           <a:p>
@@ -5694,14 +6988,10 @@
             </a:pPr>
             <a:r>
               <a:rPr lang="pt-PT" dirty="0" smtClean="0"/>
-              <a:t>Coleção</a:t>
-            </a:r>
-          </a:p>
-          <a:p>
-            <a:pPr marL="514350" indent="-514350">
-              <a:buFont typeface="+mj-lt"/>
-              <a:buAutoNum type="arabicPeriod"/>
-            </a:pPr>
+              <a:t>Coleção-Livro</a:t>
+            </a:r>
+          </a:p>
+          <a:p>
             <a:endParaRPr lang="pt-PT" dirty="0" smtClean="0"/>
           </a:p>
           <a:p>
@@ -5712,7 +7002,7 @@
     </p:spTree>
     <p:extLst>
       <p:ext uri="{BB962C8B-B14F-4D97-AF65-F5344CB8AC3E}">
-        <p14:creationId xmlns:p14="http://schemas.microsoft.com/office/powerpoint/2010/main" val="2055100121"/>
+        <p14:creationId xmlns:p14="http://schemas.microsoft.com/office/powerpoint/2010/main" val="1976290187"/>
       </p:ext>
     </p:extLst>
   </p:cSld>
@@ -5741,31 +7031,6 @@
       </p:grpSpPr>
       <p:sp>
         <p:nvSpPr>
-          <p:cNvPr id="2" name="Título 1"/>
-          <p:cNvSpPr>
-            <a:spLocks noGrp="1"/>
-          </p:cNvSpPr>
-          <p:nvPr>
-            <p:ph type="title"/>
-          </p:nvPr>
-        </p:nvSpPr>
-        <p:spPr/>
-        <p:txBody>
-          <a:bodyPr>
-            <a:normAutofit/>
-          </a:bodyPr>
-          <a:lstStyle/>
-          <a:p>
-            <a:r>
-              <a:rPr lang="pt-PT" dirty="0" smtClean="0"/>
-              <a:t>Validação do Modelo Conceptual segundo os requisitos</a:t>
-            </a:r>
-            <a:endParaRPr lang="en-US" dirty="0"/>
-          </a:p>
-        </p:txBody>
-      </p:sp>
-      <p:sp>
-        <p:nvSpPr>
           <p:cNvPr id="3" name="Marcador de Posição de Conteúdo 2"/>
           <p:cNvSpPr>
             <a:spLocks noGrp="1"/>
@@ -5776,189 +7041,143 @@
         </p:nvSpPr>
         <p:spPr>
           <a:xfrm>
-            <a:off x="944218" y="1865381"/>
-            <a:ext cx="10515600" cy="4351338"/>
+            <a:off x="655320" y="568324"/>
+            <a:ext cx="10866120" cy="5923915"/>
           </a:xfrm>
         </p:spPr>
         <p:txBody>
-          <a:bodyPr>
-            <a:normAutofit fontScale="70000" lnSpcReduction="20000"/>
-          </a:bodyPr>
+          <a:bodyPr/>
           <a:lstStyle/>
           <a:p>
-            <a:pPr marL="514350" indent="-514350" fontAlgn="base">
-              <a:lnSpc>
-                <a:spcPct val="120000"/>
-              </a:lnSpc>
+            <a:pPr marL="514350" indent="-514350">
               <a:buFont typeface="+mj-lt"/>
               <a:buAutoNum type="arabicPeriod"/>
             </a:pPr>
             <a:r>
-              <a:rPr lang="en-US" dirty="0" smtClean="0"/>
-              <a:t>Sa</a:t>
-            </a:r>
-            <a:r>
-              <a:rPr lang="pt-PT" dirty="0" smtClean="0"/>
-              <a:t>ber </a:t>
-            </a:r>
-            <a:r>
-              <a:rPr lang="pt-PT" dirty="0"/>
-              <a:t>a designação de todas as coleções </a:t>
-            </a:r>
-            <a:r>
-              <a:rPr lang="pt-PT" dirty="0" smtClean="0"/>
-              <a:t>existentes</a:t>
-            </a:r>
-            <a:endParaRPr lang="en-US" dirty="0"/>
-          </a:p>
-          <a:p>
-            <a:pPr marL="514350" lvl="0" indent="-514350" fontAlgn="base">
-              <a:lnSpc>
-                <a:spcPct val="120000"/>
-              </a:lnSpc>
+              <a:rPr lang="pt-PT" dirty="0" smtClean="0"/>
+              <a:t>Livro-Autor</a:t>
+            </a:r>
+          </a:p>
+          <a:p>
+            <a:pPr marL="971550" lvl="1" indent="-514350">
               <a:buFont typeface="+mj-lt"/>
               <a:buAutoNum type="arabicPeriod"/>
             </a:pPr>
             <a:r>
-              <a:rPr lang="pt-PT" dirty="0"/>
-              <a:t>Saber quantos livros cada colecção </a:t>
-            </a:r>
-            <a:r>
-              <a:rPr lang="pt-PT" dirty="0" smtClean="0"/>
-              <a:t>tem</a:t>
-            </a:r>
-            <a:endParaRPr lang="en-US" dirty="0"/>
-          </a:p>
-          <a:p>
-            <a:pPr marL="514350" lvl="0" indent="-514350" fontAlgn="base">
-              <a:lnSpc>
-                <a:spcPct val="120000"/>
-              </a:lnSpc>
+              <a:rPr lang="pt-PT" dirty="0" smtClean="0"/>
+              <a:t>Um livro é escrito por um autor; N -&gt; N   </a:t>
+            </a:r>
+          </a:p>
+          <a:p>
+            <a:pPr marL="514350" indent="-514350">
               <a:buFont typeface="+mj-lt"/>
               <a:buAutoNum type="arabicPeriod"/>
             </a:pPr>
-            <a:r>
-              <a:rPr lang="pt-PT" dirty="0"/>
-              <a:t>Saber lista de nomes dos autores dos livros da biblioteca.</a:t>
-            </a:r>
-            <a:endParaRPr lang="en-US" dirty="0"/>
-          </a:p>
-          <a:p>
-            <a:pPr marL="514350" lvl="0" indent="-514350" fontAlgn="base">
-              <a:lnSpc>
-                <a:spcPct val="120000"/>
-              </a:lnSpc>
+            <a:endParaRPr lang="pt-PT" dirty="0"/>
+          </a:p>
+          <a:p>
+            <a:pPr marL="514350" indent="-514350">
               <a:buFont typeface="+mj-lt"/>
               <a:buAutoNum type="arabicPeriod"/>
             </a:pPr>
             <a:r>
-              <a:rPr lang="pt-PT" dirty="0"/>
-              <a:t>Saber o apelido e primeiros nomes de um autor.</a:t>
-            </a:r>
-            <a:endParaRPr lang="en-US" dirty="0"/>
-          </a:p>
-          <a:p>
-            <a:pPr marL="514350" lvl="0" indent="-514350" fontAlgn="base">
-              <a:lnSpc>
-                <a:spcPct val="120000"/>
-              </a:lnSpc>
+              <a:rPr lang="pt-PT" dirty="0" smtClean="0"/>
+              <a:t>Livro-Editora</a:t>
+            </a:r>
+          </a:p>
+          <a:p>
+            <a:pPr marL="971550" lvl="1" indent="-514350">
               <a:buFont typeface="+mj-lt"/>
               <a:buAutoNum type="arabicPeriod"/>
             </a:pPr>
             <a:r>
-              <a:rPr lang="pt-PT" dirty="0"/>
-              <a:t>Saber lista de editoras dos livros da biblioteca</a:t>
-            </a:r>
-            <a:r>
-              <a:rPr lang="pt-PT" dirty="0" smtClean="0"/>
-              <a:t>.</a:t>
-            </a:r>
-          </a:p>
-          <a:p>
-            <a:pPr marL="514350" indent="-514350" fontAlgn="base">
-              <a:lnSpc>
-                <a:spcPct val="120000"/>
-              </a:lnSpc>
+              <a:rPr lang="pt-PT" dirty="0" smtClean="0"/>
+              <a:t>Livro tem editora N -&gt; N </a:t>
+            </a:r>
+          </a:p>
+          <a:p>
+            <a:pPr marL="1428750" lvl="2" indent="-514350">
               <a:buFont typeface="+mj-lt"/>
               <a:buAutoNum type="arabicPeriod"/>
             </a:pPr>
             <a:r>
-              <a:rPr lang="pt-PT" dirty="0"/>
-              <a:t>Para uma dada editora, saber a sua designação.</a:t>
-            </a:r>
-            <a:endParaRPr lang="en-US" dirty="0"/>
-          </a:p>
-          <a:p>
-            <a:pPr marL="514350" indent="-514350" fontAlgn="base">
-              <a:lnSpc>
-                <a:spcPct val="120000"/>
-              </a:lnSpc>
+              <a:rPr lang="pt-PT" b="1" dirty="0" smtClean="0">
+                <a:latin typeface="Century Gothic" panose="020B0502020202020204" pitchFamily="34" charset="0"/>
+              </a:rPr>
+              <a:t>EDIÇAO: de um livro por uma dada editora</a:t>
+            </a:r>
+          </a:p>
+          <a:p>
+            <a:pPr marL="1428750" lvl="2" indent="-514350">
               <a:buFont typeface="+mj-lt"/>
               <a:buAutoNum type="arabicPeriod"/>
             </a:pPr>
             <a:r>
-              <a:rPr lang="pt-PT" dirty="0"/>
-              <a:t>Pesquisar um livro segundo: ISSN, ISBN, código de barras e título.</a:t>
-            </a:r>
-            <a:endParaRPr lang="en-US" dirty="0"/>
-          </a:p>
-          <a:p>
-            <a:pPr marL="514350" indent="-514350" fontAlgn="base">
-              <a:lnSpc>
-                <a:spcPct val="120000"/>
-              </a:lnSpc>
+              <a:rPr lang="pt-PT" b="1" dirty="0" smtClean="0">
+                <a:latin typeface="Century Gothic" panose="020B0502020202020204" pitchFamily="34" charset="0"/>
+              </a:rPr>
+              <a:t>ANO: em que uma edição de um livro foi publicada</a:t>
+            </a:r>
+          </a:p>
+          <a:p>
+            <a:pPr marL="457200" lvl="1" indent="0">
+              <a:buNone/>
+            </a:pPr>
+            <a:endParaRPr lang="pt-PT" dirty="0"/>
+          </a:p>
+          <a:p>
+            <a:pPr marL="514350" indent="-514350">
               <a:buFont typeface="+mj-lt"/>
               <a:buAutoNum type="arabicPeriod"/>
             </a:pPr>
             <a:r>
-              <a:rPr lang="pt-PT" dirty="0"/>
-              <a:t>Saber os livros que um autor escreveu.</a:t>
-            </a:r>
-            <a:endParaRPr lang="en-US" dirty="0"/>
-          </a:p>
-          <a:p>
-            <a:pPr marL="514350" indent="-514350" fontAlgn="base">
-              <a:lnSpc>
-                <a:spcPct val="120000"/>
-              </a:lnSpc>
+              <a:rPr lang="pt-PT" dirty="0" smtClean="0"/>
+              <a:t>Livro-Exemplar</a:t>
+            </a:r>
+          </a:p>
+          <a:p>
+            <a:pPr marL="971550" lvl="1" indent="-514350">
               <a:buFont typeface="+mj-lt"/>
               <a:buAutoNum type="arabicPeriod"/>
             </a:pPr>
             <a:r>
               <a:rPr lang="pt-PT" dirty="0"/>
-              <a:t>Saber os livros que uma editora publicou.</a:t>
-            </a:r>
-            <a:endParaRPr lang="en-US" dirty="0"/>
-          </a:p>
-          <a:p>
-            <a:pPr marL="514350" indent="-514350" fontAlgn="base">
-              <a:lnSpc>
-                <a:spcPct val="120000"/>
-              </a:lnSpc>
+              <a:t>1</a:t>
+            </a:r>
+            <a:r>
+              <a:rPr lang="pt-PT" dirty="0" smtClean="0"/>
+              <a:t> -&gt; N (1 livro tem n exemplares. 1 exemplar vem de 1 só livro)</a:t>
+            </a:r>
+          </a:p>
+          <a:p>
+            <a:pPr marL="971550" lvl="1" indent="-514350">
               <a:buFont typeface="+mj-lt"/>
               <a:buAutoNum type="arabicPeriod"/>
             </a:pPr>
-            <a:r>
-              <a:rPr lang="pt-PT" dirty="0"/>
-              <a:t>Saber os livros pertencentes a uma colecção</a:t>
-            </a:r>
-            <a:r>
-              <a:rPr lang="pt-PT" dirty="0" smtClean="0"/>
-              <a:t>.</a:t>
-            </a:r>
-            <a:endParaRPr lang="en-US" dirty="0"/>
-          </a:p>
-          <a:p>
-            <a:pPr marL="514350" indent="-514350" fontAlgn="base">
+            <a:endParaRPr lang="pt-PT" dirty="0"/>
+          </a:p>
+          <a:p>
+            <a:pPr marL="514350" indent="-514350">
               <a:buFont typeface="+mj-lt"/>
               <a:buAutoNum type="arabicPeriod"/>
             </a:pPr>
-            <a:endParaRPr lang="en-US" dirty="0"/>
-          </a:p>
-          <a:p>
-            <a:pPr marL="0" indent="0">
-              <a:buNone/>
-            </a:pPr>
+            <a:r>
+              <a:rPr lang="pt-PT" dirty="0" smtClean="0"/>
+              <a:t>Exemplar-Requisição</a:t>
+            </a:r>
+          </a:p>
+          <a:p>
+            <a:pPr marL="971550" lvl="1" indent="-514350">
+              <a:buFont typeface="+mj-lt"/>
+              <a:buAutoNum type="arabicPeriod"/>
+            </a:pPr>
+            <a:r>
+              <a:rPr lang="pt-PT" dirty="0" smtClean="0"/>
+              <a:t>Exemplar participa em uma requisição. 1 -&gt; N   1 só exemplar tem N requisições. 1 Requisição diz respeito a um único exemplar!  </a:t>
+            </a:r>
+            <a:endParaRPr lang="pt-PT" dirty="0"/>
+          </a:p>
+          <a:p>
             <a:endParaRPr lang="en-US" dirty="0"/>
           </a:p>
         </p:txBody>
@@ -5966,7 +7185,7 @@
     </p:spTree>
     <p:extLst>
       <p:ext uri="{BB962C8B-B14F-4D97-AF65-F5344CB8AC3E}">
-        <p14:creationId xmlns:p14="http://schemas.microsoft.com/office/powerpoint/2010/main" val="127093835"/>
+        <p14:creationId xmlns:p14="http://schemas.microsoft.com/office/powerpoint/2010/main" val="3031217419"/>
       </p:ext>
     </p:extLst>
   </p:cSld>
@@ -6005,133 +7224,120 @@
         </p:nvSpPr>
         <p:spPr>
           <a:xfrm>
-            <a:off x="838200" y="516834"/>
-            <a:ext cx="10515600" cy="6341165"/>
+            <a:off x="632460" y="454024"/>
+            <a:ext cx="11094720" cy="5741035"/>
           </a:xfrm>
         </p:spPr>
         <p:txBody>
-          <a:bodyPr>
-            <a:normAutofit fontScale="85000" lnSpcReduction="10000"/>
-          </a:bodyPr>
+          <a:bodyPr/>
           <a:lstStyle/>
           <a:p>
-            <a:pPr marL="514350" indent="-514350" fontAlgn="base">
-              <a:lnSpc>
-                <a:spcPct val="120000"/>
-              </a:lnSpc>
+            <a:pPr marL="514350" indent="-514350">
               <a:buFont typeface="+mj-lt"/>
-              <a:buAutoNum type="arabicPeriod" startAt="11"/>
-            </a:pPr>
-            <a:r>
-              <a:rPr lang="pt-PT" dirty="0" smtClean="0"/>
-              <a:t>Saber os livros que têm uma dada CDU.</a:t>
-            </a:r>
-            <a:endParaRPr lang="en-US" dirty="0" smtClean="0"/>
-          </a:p>
-          <a:p>
-            <a:pPr marL="514350" indent="-514350" fontAlgn="base">
-              <a:lnSpc>
-                <a:spcPct val="120000"/>
-              </a:lnSpc>
+              <a:buAutoNum type="arabicPeriod"/>
+            </a:pPr>
+            <a:r>
+              <a:rPr lang="pt-PT" dirty="0" smtClean="0"/>
+              <a:t>Exemplar-Utilizador</a:t>
+            </a:r>
+          </a:p>
+          <a:p>
+            <a:pPr marL="971550" lvl="1" indent="-514350">
               <a:buFont typeface="+mj-lt"/>
-              <a:buAutoNum type="arabicPeriod" startAt="11"/>
-            </a:pPr>
-            <a:r>
-              <a:rPr lang="pt-PT" dirty="0" smtClean="0"/>
-              <a:t>Fazer pesquisa por título do livro, que corresponde a obter uma lista de livros que têm no seu título o conjunto de palavras indicado no campo da pesquisa.</a:t>
-            </a:r>
-            <a:endParaRPr lang="en-US" dirty="0" smtClean="0"/>
-          </a:p>
-          <a:p>
-            <a:pPr marL="514350" indent="-514350" fontAlgn="base">
-              <a:lnSpc>
-                <a:spcPct val="120000"/>
-              </a:lnSpc>
+              <a:buAutoNum type="arabicPeriod"/>
+            </a:pPr>
+            <a:r>
+              <a:rPr lang="pt-PT" dirty="0"/>
+              <a:t>N</a:t>
+            </a:r>
+            <a:r>
+              <a:rPr lang="pt-PT" dirty="0" smtClean="0"/>
+              <a:t> exemplar são reservados por </a:t>
+            </a:r>
+            <a:r>
+              <a:rPr lang="pt-PT" dirty="0"/>
+              <a:t>N</a:t>
+            </a:r>
+            <a:r>
+              <a:rPr lang="pt-PT" dirty="0" smtClean="0"/>
+              <a:t> utilizadores;  N -&gt; N</a:t>
+            </a:r>
+          </a:p>
+          <a:p>
+            <a:pPr marL="1428750" lvl="2" indent="-514350">
               <a:buFont typeface="+mj-lt"/>
-              <a:buAutoNum type="arabicPeriod" startAt="11"/>
-            </a:pPr>
-            <a:r>
-              <a:rPr lang="pt-PT" dirty="0" smtClean="0"/>
-              <a:t>Para um dado livro, saber o seu ISSN, ISBN, código de barras, título, editora, autor, edição, CDU, ano de publicação e número de exemplares.</a:t>
-            </a:r>
-            <a:endParaRPr lang="en-US" dirty="0" smtClean="0"/>
-          </a:p>
-          <a:p>
-            <a:pPr marL="514350" indent="-514350" fontAlgn="base">
-              <a:lnSpc>
-                <a:spcPct val="120000"/>
-              </a:lnSpc>
+              <a:buAutoNum type="arabicPeriod"/>
+            </a:pPr>
+            <a:r>
+              <a:rPr lang="pt-PT" b="1" dirty="0">
+                <a:latin typeface="Century Gothic" panose="020B0502020202020204" pitchFamily="34" charset="0"/>
+              </a:rPr>
+              <a:t>DATA </a:t>
+            </a:r>
+            <a:r>
+              <a:rPr lang="pt-PT" b="1" dirty="0" smtClean="0">
+                <a:latin typeface="Century Gothic" panose="020B0502020202020204" pitchFamily="34" charset="0"/>
+              </a:rPr>
+              <a:t>RESERVA: data em que o pedido de reserva foi efetuado</a:t>
+            </a:r>
+            <a:endParaRPr lang="pt-PT" b="1" dirty="0">
+              <a:latin typeface="Century Gothic" panose="020B0502020202020204" pitchFamily="34" charset="0"/>
+            </a:endParaRPr>
+          </a:p>
+          <a:p>
+            <a:pPr marL="1428750" lvl="2" indent="-514350">
               <a:buFont typeface="+mj-lt"/>
-              <a:buAutoNum type="arabicPeriod" startAt="11"/>
-            </a:pPr>
-            <a:r>
-              <a:rPr lang="pt-PT" dirty="0" smtClean="0"/>
-              <a:t>Saber a localização de livros de uma certa CDU.</a:t>
-            </a:r>
-            <a:endParaRPr lang="en-US" dirty="0" smtClean="0"/>
-          </a:p>
-          <a:p>
-            <a:pPr marL="514350" indent="-514350" fontAlgn="base">
-              <a:lnSpc>
-                <a:spcPct val="120000"/>
-              </a:lnSpc>
+              <a:buAutoNum type="arabicPeriod"/>
+            </a:pPr>
+            <a:r>
+              <a:rPr lang="pt-PT" b="1" dirty="0" smtClean="0">
+                <a:latin typeface="Century Gothic" panose="020B0502020202020204" pitchFamily="34" charset="0"/>
+              </a:rPr>
+              <a:t>ESTADO: em que estado se encontra a reserva</a:t>
+            </a:r>
+            <a:endParaRPr lang="pt-PT" b="1" dirty="0">
+              <a:latin typeface="Century Gothic" panose="020B0502020202020204" pitchFamily="34" charset="0"/>
+            </a:endParaRPr>
+          </a:p>
+          <a:p>
+            <a:pPr marL="514350" indent="-514350">
               <a:buFont typeface="+mj-lt"/>
-              <a:buAutoNum type="arabicPeriod" startAt="11"/>
-            </a:pPr>
-            <a:r>
-              <a:rPr lang="pt-PT" dirty="0" smtClean="0"/>
-              <a:t>Para cada exemplar saber o estado de disponibilidade (reservado, requisitado ou não requisitável), o estado de conservação do exemplar bem como a sua localização na biblioteca (piso, estante e prateleira).</a:t>
-            </a:r>
-            <a:endParaRPr lang="en-US" dirty="0" smtClean="0"/>
-          </a:p>
-          <a:p>
-            <a:pPr marL="514350" lvl="0" indent="-514350" fontAlgn="base">
-              <a:lnSpc>
-                <a:spcPct val="120000"/>
-              </a:lnSpc>
+              <a:buAutoNum type="arabicPeriod"/>
+            </a:pPr>
+            <a:r>
+              <a:rPr lang="pt-PT" dirty="0"/>
+              <a:t>Exemplar-Localização</a:t>
+            </a:r>
+          </a:p>
+          <a:p>
+            <a:pPr marL="514350" indent="-514350">
               <a:buFont typeface="+mj-lt"/>
-              <a:buAutoNum type="arabicPeriod" startAt="11"/>
-            </a:pPr>
-            <a:r>
-              <a:rPr lang="pt-PT" dirty="0" smtClean="0"/>
-              <a:t>Reservar exemplares de um ou mais livros.</a:t>
-            </a:r>
-            <a:endParaRPr lang="en-US" dirty="0" smtClean="0"/>
-          </a:p>
-          <a:p>
-            <a:pPr marL="514350" indent="-514350" fontAlgn="base">
-              <a:lnSpc>
-                <a:spcPct val="120000"/>
-              </a:lnSpc>
+              <a:buAutoNum type="arabicPeriod"/>
+            </a:pPr>
+            <a:r>
+              <a:rPr lang="pt-PT" dirty="0"/>
+              <a:t>Requisição-Utilizador</a:t>
+            </a:r>
+          </a:p>
+          <a:p>
+            <a:pPr marL="514350" indent="-514350">
               <a:buFont typeface="+mj-lt"/>
-              <a:buAutoNum type="arabicPeriod" startAt="11"/>
-            </a:pPr>
-            <a:r>
-              <a:rPr lang="pt-PT" dirty="0" smtClean="0"/>
-              <a:t>Saber data de reserva e seu estado (pendente, exemplar disponível para levantamento, reserva concluída ou cancelada).</a:t>
-            </a:r>
-            <a:endParaRPr lang="en-US" dirty="0" smtClean="0"/>
-          </a:p>
-          <a:p>
-            <a:pPr marL="514350" indent="-514350" fontAlgn="base">
-              <a:lnSpc>
-                <a:spcPct val="120000"/>
-              </a:lnSpc>
-              <a:buFont typeface="+mj-lt"/>
-              <a:buAutoNum type="arabicPeriod" startAt="11"/>
-            </a:pPr>
-            <a:r>
-              <a:rPr lang="pt-PT" dirty="0" smtClean="0"/>
-              <a:t>Cancelar reserva de exemplar.</a:t>
-            </a:r>
-            <a:endParaRPr lang="en-US" dirty="0" smtClean="0"/>
+              <a:buAutoNum type="arabicPeriod"/>
+            </a:pPr>
+            <a:r>
+              <a:rPr lang="pt-PT" dirty="0"/>
+              <a:t>Coleção-Livro</a:t>
+            </a:r>
+          </a:p>
+          <a:p>
+            <a:endParaRPr lang="en-US" dirty="0"/>
           </a:p>
         </p:txBody>
       </p:sp>
     </p:spTree>
     <p:extLst>
       <p:ext uri="{BB962C8B-B14F-4D97-AF65-F5344CB8AC3E}">
-        <p14:creationId xmlns:p14="http://schemas.microsoft.com/office/powerpoint/2010/main" val="2769558942"/>
+        <p14:creationId xmlns:p14="http://schemas.microsoft.com/office/powerpoint/2010/main" val="4114242583"/>
       </p:ext>
     </p:extLst>
   </p:cSld>
@@ -6160,6 +7366,29 @@
       </p:grpSpPr>
       <p:sp>
         <p:nvSpPr>
+          <p:cNvPr id="2" name="Título 1"/>
+          <p:cNvSpPr>
+            <a:spLocks noGrp="1"/>
+          </p:cNvSpPr>
+          <p:nvPr>
+            <p:ph type="title"/>
+          </p:nvPr>
+        </p:nvSpPr>
+        <p:spPr/>
+        <p:txBody>
+          <a:bodyPr/>
+          <a:lstStyle/>
+          <a:p>
+            <a:r>
+              <a:rPr lang="pt-PT" dirty="0" smtClean="0"/>
+              <a:t>Identificação dos Atributos</a:t>
+            </a:r>
+            <a:endParaRPr lang="en-US" dirty="0"/>
+          </a:p>
+        </p:txBody>
+      </p:sp>
+      <p:sp>
+        <p:nvSpPr>
           <p:cNvPr id="3" name="Marcador de Posição de Conteúdo 2"/>
           <p:cNvSpPr>
             <a:spLocks noGrp="1"/>
@@ -6168,161 +7397,102 @@
             <p:ph idx="1"/>
           </p:nvPr>
         </p:nvSpPr>
-        <p:spPr>
-          <a:xfrm>
-            <a:off x="746760" y="384313"/>
-            <a:ext cx="10515600" cy="6241773"/>
-          </a:xfrm>
-        </p:spPr>
+        <p:spPr/>
         <p:txBody>
           <a:bodyPr>
-            <a:normAutofit fontScale="85000" lnSpcReduction="20000"/>
+            <a:normAutofit/>
           </a:bodyPr>
           <a:lstStyle/>
           <a:p>
-            <a:pPr marL="514350" indent="-514350" fontAlgn="base">
-              <a:lnSpc>
-                <a:spcPct val="120000"/>
-              </a:lnSpc>
+            <a:pPr marL="514350" indent="-514350">
               <a:buFont typeface="+mj-lt"/>
-              <a:buAutoNum type="arabicPeriod" startAt="19"/>
-            </a:pPr>
-            <a:r>
-              <a:rPr lang="pt-PT" dirty="0" smtClean="0"/>
-              <a:t>Efetuar requisição de um exemplar.</a:t>
-            </a:r>
-            <a:endParaRPr lang="en-US" dirty="0" smtClean="0"/>
-          </a:p>
-          <a:p>
-            <a:pPr marL="514350" indent="-514350" fontAlgn="base">
-              <a:lnSpc>
-                <a:spcPct val="120000"/>
-              </a:lnSpc>
+              <a:buAutoNum type="arabicPeriod"/>
+            </a:pPr>
+            <a:r>
+              <a:rPr lang="pt-PT" dirty="0" smtClean="0"/>
+              <a:t>Atributos do Livro</a:t>
+            </a:r>
+          </a:p>
+          <a:p>
+            <a:pPr marL="514350" indent="-514350">
               <a:buFont typeface="+mj-lt"/>
-              <a:buAutoNum type="arabicPeriod" startAt="19"/>
-            </a:pPr>
-            <a:r>
-              <a:rPr lang="pt-PT" dirty="0" smtClean="0"/>
-              <a:t>Para uma requisição, saber o seu estado (ativa ou não), em que data foi realizada, em que data deverá ser entregue o exemplar qual o número de renovações efetuado e qual o número de máximo de renovações em vigor na data da reserva.</a:t>
-            </a:r>
-            <a:endParaRPr lang="en-US" dirty="0" smtClean="0"/>
-          </a:p>
-          <a:p>
-            <a:pPr marL="514350" indent="-514350" fontAlgn="base">
-              <a:lnSpc>
-                <a:spcPct val="120000"/>
-              </a:lnSpc>
+              <a:buAutoNum type="arabicPeriod"/>
+            </a:pPr>
+            <a:r>
+              <a:rPr lang="pt-PT" dirty="0" smtClean="0"/>
+              <a:t>Do Autor</a:t>
+            </a:r>
+          </a:p>
+          <a:p>
+            <a:pPr marL="514350" indent="-514350">
               <a:buFont typeface="+mj-lt"/>
-              <a:buAutoNum type="arabicPeriod" startAt="19"/>
-            </a:pPr>
-            <a:r>
-              <a:rPr lang="pt-PT" dirty="0" smtClean="0"/>
-              <a:t>Renovar uma requisição, não excedendo o número máximo de renovações permitido.</a:t>
-            </a:r>
-            <a:endParaRPr lang="pt-PT" dirty="0" smtClean="0"/>
-          </a:p>
-          <a:p>
-            <a:pPr marL="514350" lvl="0" indent="-514350">
-              <a:lnSpc>
-                <a:spcPct val="120000"/>
-              </a:lnSpc>
+              <a:buAutoNum type="arabicPeriod"/>
+            </a:pPr>
+            <a:r>
+              <a:rPr lang="pt-PT" dirty="0" smtClean="0"/>
+              <a:t>De Editora</a:t>
+            </a:r>
+          </a:p>
+          <a:p>
+            <a:pPr marL="514350" indent="-514350">
               <a:buFont typeface="+mj-lt"/>
-              <a:buAutoNum type="arabicPeriod" startAt="22"/>
-            </a:pPr>
-            <a:r>
-              <a:rPr lang="pt-PT" dirty="0" smtClean="0"/>
-              <a:t>Concluir </a:t>
-            </a:r>
-            <a:r>
-              <a:rPr lang="pt-PT" dirty="0"/>
-              <a:t>requisição, que corresponde à devolução do exemplar requisitado</a:t>
-            </a:r>
-            <a:r>
-              <a:rPr lang="pt-PT" dirty="0" smtClean="0"/>
-              <a:t>.</a:t>
-            </a:r>
-            <a:endParaRPr lang="en-US" dirty="0"/>
-          </a:p>
-          <a:p>
-            <a:pPr marL="514350" lvl="0" indent="-514350" fontAlgn="base">
-              <a:lnSpc>
-                <a:spcPct val="120000"/>
-              </a:lnSpc>
+              <a:buAutoNum type="arabicPeriod"/>
+            </a:pPr>
+            <a:r>
+              <a:rPr lang="pt-PT" dirty="0" smtClean="0"/>
+              <a:t>De Exemplar</a:t>
+            </a:r>
+          </a:p>
+          <a:p>
+            <a:pPr marL="514350" indent="-514350">
               <a:buFont typeface="+mj-lt"/>
-              <a:buAutoNum type="arabicPeriod" startAt="22"/>
-            </a:pPr>
-            <a:r>
-              <a:rPr lang="pt-PT" dirty="0"/>
-              <a:t>Gerar estatísticas de número de renovações médio e saber quantos utilizadores usam o número máximo de requisições permitidas</a:t>
-            </a:r>
-            <a:r>
-              <a:rPr lang="pt-PT" dirty="0" smtClean="0"/>
-              <a:t>.</a:t>
-            </a:r>
-          </a:p>
-          <a:p>
-            <a:pPr marL="514350" indent="-514350" fontAlgn="base">
-              <a:lnSpc>
-                <a:spcPct val="120000"/>
-              </a:lnSpc>
+              <a:buAutoNum type="arabicPeriod"/>
+            </a:pPr>
+            <a:r>
+              <a:rPr lang="pt-PT" dirty="0" smtClean="0"/>
+              <a:t>De Requisição</a:t>
+            </a:r>
+          </a:p>
+          <a:p>
+            <a:pPr marL="514350" indent="-514350">
               <a:buFont typeface="+mj-lt"/>
-              <a:buAutoNum type="arabicPeriod" startAt="22"/>
-            </a:pPr>
-            <a:r>
-              <a:rPr lang="pt-PT" dirty="0" smtClean="0">
-                <a:effectLst/>
-              </a:rPr>
-              <a:t>Registar utilizadores internos ou externos como requisitantes.</a:t>
-            </a:r>
-            <a:endParaRPr lang="en-US" dirty="0" smtClean="0">
-              <a:effectLst/>
-            </a:endParaRPr>
-          </a:p>
-          <a:p>
-            <a:pPr marL="514350" indent="-514350" fontAlgn="base">
-              <a:lnSpc>
-                <a:spcPct val="120000"/>
-              </a:lnSpc>
+              <a:buAutoNum type="arabicPeriod"/>
+            </a:pPr>
+            <a:r>
+              <a:rPr lang="pt-PT" dirty="0" smtClean="0"/>
+              <a:t>De Utilizador</a:t>
+            </a:r>
+          </a:p>
+          <a:p>
+            <a:pPr marL="514350" indent="-514350">
               <a:buFont typeface="+mj-lt"/>
-              <a:buAutoNum type="arabicPeriod" startAt="22"/>
-            </a:pPr>
-            <a:r>
-              <a:rPr lang="pt-PT" dirty="0" smtClean="0">
-                <a:effectLst/>
-              </a:rPr>
-              <a:t>Para um dado utilizador, saber o seu tipo, nome, email (contacto principal), CC, número mecanográfico e contacto alternativo (telefone).</a:t>
-            </a:r>
-            <a:endParaRPr lang="en-US" dirty="0" smtClean="0">
-              <a:effectLst/>
-            </a:endParaRPr>
-          </a:p>
-          <a:p>
-            <a:pPr marL="514350" indent="-514350" fontAlgn="base">
-              <a:lnSpc>
-                <a:spcPct val="120000"/>
-              </a:lnSpc>
+              <a:buAutoNum type="arabicPeriod"/>
+            </a:pPr>
+            <a:r>
+              <a:rPr lang="pt-PT" dirty="0" smtClean="0"/>
+              <a:t>De Localização</a:t>
+            </a:r>
+          </a:p>
+          <a:p>
+            <a:pPr marL="514350" indent="-514350">
               <a:buFont typeface="+mj-lt"/>
-              <a:buAutoNum type="arabicPeriod" startAt="22"/>
-            </a:pPr>
-            <a:r>
-              <a:rPr lang="pt-PT" dirty="0"/>
-              <a:t>Saber os utilizadores que reservaram/requisitaram determinado exemplar</a:t>
-            </a:r>
-            <a:r>
-              <a:rPr lang="pt-PT" dirty="0" smtClean="0"/>
-              <a:t>.</a:t>
-            </a:r>
-            <a:endParaRPr lang="en-US" dirty="0"/>
-          </a:p>
-          <a:p>
-            <a:endParaRPr lang="en-US" dirty="0"/>
+              <a:buAutoNum type="arabicPeriod"/>
+            </a:pPr>
+            <a:r>
+              <a:rPr lang="pt-PT" dirty="0" smtClean="0"/>
+              <a:t>De Coleç</a:t>
+            </a:r>
+            <a:r>
+              <a:rPr lang="en-US" dirty="0" smtClean="0"/>
+              <a:t>ão</a:t>
+            </a:r>
           </a:p>
         </p:txBody>
       </p:sp>
     </p:spTree>
     <p:extLst>
       <p:ext uri="{BB962C8B-B14F-4D97-AF65-F5344CB8AC3E}">
-        <p14:creationId xmlns:p14="http://schemas.microsoft.com/office/powerpoint/2010/main" val="2856968020"/>
+        <p14:creationId xmlns:p14="http://schemas.microsoft.com/office/powerpoint/2010/main" val="3081524983"/>
       </p:ext>
     </p:extLst>
   </p:cSld>
@@ -6364,23 +7534,15 @@
           <a:bodyPr/>
           <a:lstStyle/>
           <a:p>
-            <a:pPr lvl="1" algn="l" rtl="0">
-              <a:lnSpc>
-                <a:spcPct val="90000"/>
-              </a:lnSpc>
-              <a:spcBef>
-                <a:spcPct val="0"/>
-              </a:spcBef>
-            </a:pPr>
-            <a:r>
-              <a:rPr lang="pt-PT" sz="2800" b="1" dirty="0" smtClean="0"/>
-              <a:t>Validação do Modelo Conceptual segundo as </a:t>
-            </a:r>
-            <a:r>
-              <a:rPr lang="pt-PT" sz="2800" b="1" u="sng" dirty="0" smtClean="0"/>
-              <a:t>transações</a:t>
-            </a:r>
-            <a:endParaRPr lang="en-US" b="1" u="sng" dirty="0"/>
+            <a:pPr>
+              <a:lnSpc>
+                <a:spcPct val="150000"/>
+              </a:lnSpc>
+            </a:pPr>
+            <a:r>
+              <a:rPr lang="pt-PT" dirty="0" smtClean="0"/>
+              <a:t>Identificação das Chaves</a:t>
+            </a:r>
           </a:p>
         </p:txBody>
       </p:sp>
@@ -6399,50 +7561,91 @@
           <a:bodyPr/>
           <a:lstStyle/>
           <a:p>
-            <a:pPr marL="514350" lvl="0" indent="-514350">
-              <a:lnSpc>
-                <a:spcPct val="200000"/>
-              </a:lnSpc>
+            <a:pPr marL="514350" indent="-514350">
               <a:buFont typeface="+mj-lt"/>
               <a:buAutoNum type="arabicPeriod"/>
             </a:pPr>
             <a:r>
-              <a:rPr lang="pt-PT" dirty="0"/>
-              <a:t>Qual(is) a(s) localização(ões) (piso, estante e prateleira) dos exemplares de um livro com determinado título?</a:t>
-            </a:r>
-            <a:endParaRPr lang="en-US" dirty="0"/>
-          </a:p>
-          <a:p>
-            <a:pPr marL="514350" lvl="0" indent="-514350">
-              <a:lnSpc>
-                <a:spcPct val="200000"/>
-              </a:lnSpc>
+              <a:rPr lang="pt-PT" dirty="0" smtClean="0"/>
+              <a:t>Livro</a:t>
+            </a:r>
+          </a:p>
+          <a:p>
+            <a:pPr marL="514350" indent="-514350">
               <a:buFont typeface="+mj-lt"/>
               <a:buAutoNum type="arabicPeriod"/>
             </a:pPr>
             <a:r>
-              <a:rPr lang="pt-PT" dirty="0"/>
-              <a:t>Efetuar uma requisição</a:t>
-            </a:r>
-            <a:endParaRPr lang="en-US" dirty="0"/>
-          </a:p>
-          <a:p>
-            <a:pPr marL="514350" lvl="0" indent="-514350">
-              <a:lnSpc>
-                <a:spcPct val="200000"/>
-              </a:lnSpc>
+              <a:rPr lang="pt-PT" dirty="0" smtClean="0"/>
+              <a:t>Autor</a:t>
+            </a:r>
+          </a:p>
+          <a:p>
+            <a:pPr marL="514350" indent="-514350">
               <a:buFont typeface="+mj-lt"/>
               <a:buAutoNum type="arabicPeriod"/>
             </a:pPr>
             <a:r>
               <a:rPr lang="pt-PT" dirty="0" smtClean="0"/>
-              <a:t>Efetuar </a:t>
-            </a:r>
-            <a:r>
-              <a:rPr lang="pt-PT" dirty="0"/>
-              <a:t>uma reserva</a:t>
-            </a:r>
-            <a:endParaRPr lang="en-US" dirty="0"/>
+              <a:t>Editora</a:t>
+            </a:r>
+          </a:p>
+          <a:p>
+            <a:pPr marL="514350" indent="-514350">
+              <a:buFont typeface="+mj-lt"/>
+              <a:buAutoNum type="arabicPeriod"/>
+            </a:pPr>
+            <a:r>
+              <a:rPr lang="pt-PT" dirty="0" smtClean="0"/>
+              <a:t>Exemplar</a:t>
+            </a:r>
+          </a:p>
+          <a:p>
+            <a:pPr marL="514350" indent="-514350">
+              <a:buFont typeface="+mj-lt"/>
+              <a:buAutoNum type="arabicPeriod"/>
+            </a:pPr>
+            <a:r>
+              <a:rPr lang="pt-PT" dirty="0" smtClean="0"/>
+              <a:t>Requisição</a:t>
+            </a:r>
+          </a:p>
+          <a:p>
+            <a:pPr marL="514350" indent="-514350">
+              <a:buFont typeface="+mj-lt"/>
+              <a:buAutoNum type="arabicPeriod"/>
+            </a:pPr>
+            <a:r>
+              <a:rPr lang="pt-PT" dirty="0" smtClean="0"/>
+              <a:t>Localização</a:t>
+            </a:r>
+          </a:p>
+          <a:p>
+            <a:pPr marL="514350" indent="-514350">
+              <a:buFont typeface="+mj-lt"/>
+              <a:buAutoNum type="arabicPeriod"/>
+            </a:pPr>
+            <a:r>
+              <a:rPr lang="pt-PT" dirty="0" smtClean="0"/>
+              <a:t>Utilizador</a:t>
+            </a:r>
+          </a:p>
+          <a:p>
+            <a:pPr marL="514350" indent="-514350">
+              <a:buFont typeface="+mj-lt"/>
+              <a:buAutoNum type="arabicPeriod"/>
+            </a:pPr>
+            <a:r>
+              <a:rPr lang="pt-PT" dirty="0" smtClean="0"/>
+              <a:t>Coleção</a:t>
+            </a:r>
+          </a:p>
+          <a:p>
+            <a:pPr marL="514350" indent="-514350">
+              <a:buFont typeface="+mj-lt"/>
+              <a:buAutoNum type="arabicPeriod"/>
+            </a:pPr>
+            <a:endParaRPr lang="pt-PT" dirty="0" smtClean="0"/>
           </a:p>
           <a:p>
             <a:endParaRPr lang="en-US" dirty="0"/>
@@ -6452,7 +7655,7 @@
     </p:spTree>
     <p:extLst>
       <p:ext uri="{BB962C8B-B14F-4D97-AF65-F5344CB8AC3E}">
-        <p14:creationId xmlns:p14="http://schemas.microsoft.com/office/powerpoint/2010/main" val="273823033"/>
+        <p14:creationId xmlns:p14="http://schemas.microsoft.com/office/powerpoint/2010/main" val="2055100121"/>
       </p:ext>
     </p:extLst>
   </p:cSld>
@@ -6967,7 +8170,6 @@
               <a:rPr lang="pt-PT" sz="1800" dirty="0" smtClean="0"/>
               <a:t>Modelo físico</a:t>
             </a:r>
-            <a:endParaRPr lang="pt-PT" sz="1800" dirty="0" smtClean="0"/>
           </a:p>
         </p:txBody>
       </p:sp>
@@ -6992,6 +8194,745 @@
 </file>
 
 <file path=ppt/slides/slide20.xml><?xml version="1.0" encoding="utf-8"?>
+<p:sld xmlns:a="http://schemas.openxmlformats.org/drawingml/2006/main" xmlns:r="http://schemas.openxmlformats.org/officeDocument/2006/relationships" xmlns:p="http://schemas.openxmlformats.org/presentationml/2006/main">
+  <p:cSld>
+    <p:spTree>
+      <p:nvGrpSpPr>
+        <p:cNvPr id="1" name=""/>
+        <p:cNvGrpSpPr/>
+        <p:nvPr/>
+      </p:nvGrpSpPr>
+      <p:grpSpPr>
+        <a:xfrm>
+          <a:off x="0" y="0"/>
+          <a:ext cx="0" cy="0"/>
+          <a:chOff x="0" y="0"/>
+          <a:chExt cx="0" cy="0"/>
+        </a:xfrm>
+      </p:grpSpPr>
+      <p:sp>
+        <p:nvSpPr>
+          <p:cNvPr id="2" name="Título 1"/>
+          <p:cNvSpPr>
+            <a:spLocks noGrp="1"/>
+          </p:cNvSpPr>
+          <p:nvPr>
+            <p:ph type="title"/>
+          </p:nvPr>
+        </p:nvSpPr>
+        <p:spPr/>
+        <p:txBody>
+          <a:bodyPr>
+            <a:normAutofit/>
+          </a:bodyPr>
+          <a:lstStyle/>
+          <a:p>
+            <a:r>
+              <a:rPr lang="pt-PT" dirty="0" smtClean="0"/>
+              <a:t>Validação do Modelo Conceptual segundo os requisitos</a:t>
+            </a:r>
+            <a:endParaRPr lang="en-US" dirty="0"/>
+          </a:p>
+        </p:txBody>
+      </p:sp>
+      <p:sp>
+        <p:nvSpPr>
+          <p:cNvPr id="3" name="Marcador de Posição de Conteúdo 2"/>
+          <p:cNvSpPr>
+            <a:spLocks noGrp="1"/>
+          </p:cNvSpPr>
+          <p:nvPr>
+            <p:ph idx="1"/>
+          </p:nvPr>
+        </p:nvSpPr>
+        <p:spPr>
+          <a:xfrm>
+            <a:off x="944218" y="1865381"/>
+            <a:ext cx="10515600" cy="4351338"/>
+          </a:xfrm>
+        </p:spPr>
+        <p:txBody>
+          <a:bodyPr>
+            <a:normAutofit fontScale="70000" lnSpcReduction="20000"/>
+          </a:bodyPr>
+          <a:lstStyle/>
+          <a:p>
+            <a:pPr marL="514350" indent="-514350" fontAlgn="base">
+              <a:lnSpc>
+                <a:spcPct val="120000"/>
+              </a:lnSpc>
+              <a:buFont typeface="+mj-lt"/>
+              <a:buAutoNum type="arabicPeriod"/>
+            </a:pPr>
+            <a:r>
+              <a:rPr lang="en-US" dirty="0" smtClean="0"/>
+              <a:t>Sa</a:t>
+            </a:r>
+            <a:r>
+              <a:rPr lang="pt-PT" dirty="0" smtClean="0"/>
+              <a:t>ber </a:t>
+            </a:r>
+            <a:r>
+              <a:rPr lang="pt-PT" dirty="0"/>
+              <a:t>a designação de todas as coleções </a:t>
+            </a:r>
+            <a:r>
+              <a:rPr lang="pt-PT" dirty="0" smtClean="0"/>
+              <a:t>existentes</a:t>
+            </a:r>
+            <a:endParaRPr lang="en-US" dirty="0"/>
+          </a:p>
+          <a:p>
+            <a:pPr marL="514350" lvl="0" indent="-514350" fontAlgn="base">
+              <a:lnSpc>
+                <a:spcPct val="120000"/>
+              </a:lnSpc>
+              <a:buFont typeface="+mj-lt"/>
+              <a:buAutoNum type="arabicPeriod"/>
+            </a:pPr>
+            <a:r>
+              <a:rPr lang="pt-PT" dirty="0"/>
+              <a:t>Saber quantos livros cada colecção </a:t>
+            </a:r>
+            <a:r>
+              <a:rPr lang="pt-PT" dirty="0" smtClean="0"/>
+              <a:t>tem</a:t>
+            </a:r>
+            <a:endParaRPr lang="en-US" dirty="0"/>
+          </a:p>
+          <a:p>
+            <a:pPr marL="514350" lvl="0" indent="-514350" fontAlgn="base">
+              <a:lnSpc>
+                <a:spcPct val="120000"/>
+              </a:lnSpc>
+              <a:buFont typeface="+mj-lt"/>
+              <a:buAutoNum type="arabicPeriod"/>
+            </a:pPr>
+            <a:r>
+              <a:rPr lang="pt-PT" dirty="0"/>
+              <a:t>Saber lista de nomes dos autores dos livros da biblioteca.</a:t>
+            </a:r>
+            <a:endParaRPr lang="en-US" dirty="0"/>
+          </a:p>
+          <a:p>
+            <a:pPr marL="514350" lvl="0" indent="-514350" fontAlgn="base">
+              <a:lnSpc>
+                <a:spcPct val="120000"/>
+              </a:lnSpc>
+              <a:buFont typeface="+mj-lt"/>
+              <a:buAutoNum type="arabicPeriod"/>
+            </a:pPr>
+            <a:r>
+              <a:rPr lang="pt-PT" dirty="0"/>
+              <a:t>Saber o apelido e primeiros nomes de um autor.</a:t>
+            </a:r>
+            <a:endParaRPr lang="en-US" dirty="0"/>
+          </a:p>
+          <a:p>
+            <a:pPr marL="514350" lvl="0" indent="-514350" fontAlgn="base">
+              <a:lnSpc>
+                <a:spcPct val="120000"/>
+              </a:lnSpc>
+              <a:buFont typeface="+mj-lt"/>
+              <a:buAutoNum type="arabicPeriod"/>
+            </a:pPr>
+            <a:r>
+              <a:rPr lang="pt-PT" dirty="0"/>
+              <a:t>Saber lista de editoras dos livros da biblioteca</a:t>
+            </a:r>
+            <a:r>
+              <a:rPr lang="pt-PT" dirty="0" smtClean="0"/>
+              <a:t>.</a:t>
+            </a:r>
+          </a:p>
+          <a:p>
+            <a:pPr marL="514350" indent="-514350" fontAlgn="base">
+              <a:lnSpc>
+                <a:spcPct val="120000"/>
+              </a:lnSpc>
+              <a:buFont typeface="+mj-lt"/>
+              <a:buAutoNum type="arabicPeriod"/>
+            </a:pPr>
+            <a:r>
+              <a:rPr lang="pt-PT" dirty="0"/>
+              <a:t>Para uma dada editora, saber a sua designação.</a:t>
+            </a:r>
+            <a:endParaRPr lang="en-US" dirty="0"/>
+          </a:p>
+          <a:p>
+            <a:pPr marL="514350" indent="-514350" fontAlgn="base">
+              <a:lnSpc>
+                <a:spcPct val="120000"/>
+              </a:lnSpc>
+              <a:buFont typeface="+mj-lt"/>
+              <a:buAutoNum type="arabicPeriod"/>
+            </a:pPr>
+            <a:r>
+              <a:rPr lang="pt-PT" dirty="0"/>
+              <a:t>Pesquisar um livro segundo: ISSN, ISBN, código de barras e título.</a:t>
+            </a:r>
+            <a:endParaRPr lang="en-US" dirty="0"/>
+          </a:p>
+          <a:p>
+            <a:pPr marL="514350" indent="-514350" fontAlgn="base">
+              <a:lnSpc>
+                <a:spcPct val="120000"/>
+              </a:lnSpc>
+              <a:buFont typeface="+mj-lt"/>
+              <a:buAutoNum type="arabicPeriod"/>
+            </a:pPr>
+            <a:r>
+              <a:rPr lang="pt-PT" dirty="0"/>
+              <a:t>Saber os livros que um autor escreveu.</a:t>
+            </a:r>
+            <a:endParaRPr lang="en-US" dirty="0"/>
+          </a:p>
+          <a:p>
+            <a:pPr marL="514350" indent="-514350" fontAlgn="base">
+              <a:lnSpc>
+                <a:spcPct val="120000"/>
+              </a:lnSpc>
+              <a:buFont typeface="+mj-lt"/>
+              <a:buAutoNum type="arabicPeriod"/>
+            </a:pPr>
+            <a:r>
+              <a:rPr lang="pt-PT" dirty="0"/>
+              <a:t>Saber os livros que uma editora publicou.</a:t>
+            </a:r>
+            <a:endParaRPr lang="en-US" dirty="0"/>
+          </a:p>
+          <a:p>
+            <a:pPr marL="514350" indent="-514350" fontAlgn="base">
+              <a:lnSpc>
+                <a:spcPct val="120000"/>
+              </a:lnSpc>
+              <a:buFont typeface="+mj-lt"/>
+              <a:buAutoNum type="arabicPeriod"/>
+            </a:pPr>
+            <a:r>
+              <a:rPr lang="pt-PT" dirty="0"/>
+              <a:t>Saber os livros pertencentes a uma colecção</a:t>
+            </a:r>
+            <a:r>
+              <a:rPr lang="pt-PT" dirty="0" smtClean="0"/>
+              <a:t>.</a:t>
+            </a:r>
+            <a:endParaRPr lang="en-US" dirty="0"/>
+          </a:p>
+          <a:p>
+            <a:pPr marL="514350" indent="-514350" fontAlgn="base">
+              <a:buFont typeface="+mj-lt"/>
+              <a:buAutoNum type="arabicPeriod"/>
+            </a:pPr>
+            <a:endParaRPr lang="en-US" dirty="0"/>
+          </a:p>
+          <a:p>
+            <a:pPr marL="0" indent="0">
+              <a:buNone/>
+            </a:pPr>
+            <a:endParaRPr lang="en-US" dirty="0"/>
+          </a:p>
+        </p:txBody>
+      </p:sp>
+    </p:spTree>
+    <p:extLst>
+      <p:ext uri="{BB962C8B-B14F-4D97-AF65-F5344CB8AC3E}">
+        <p14:creationId xmlns:p14="http://schemas.microsoft.com/office/powerpoint/2010/main" val="127093835"/>
+      </p:ext>
+    </p:extLst>
+  </p:cSld>
+  <p:clrMapOvr>
+    <a:masterClrMapping/>
+  </p:clrMapOvr>
+</p:sld>
+</file>
+
+<file path=ppt/slides/slide21.xml><?xml version="1.0" encoding="utf-8"?>
+<p:sld xmlns:a="http://schemas.openxmlformats.org/drawingml/2006/main" xmlns:r="http://schemas.openxmlformats.org/officeDocument/2006/relationships" xmlns:p="http://schemas.openxmlformats.org/presentationml/2006/main">
+  <p:cSld>
+    <p:spTree>
+      <p:nvGrpSpPr>
+        <p:cNvPr id="1" name=""/>
+        <p:cNvGrpSpPr/>
+        <p:nvPr/>
+      </p:nvGrpSpPr>
+      <p:grpSpPr>
+        <a:xfrm>
+          <a:off x="0" y="0"/>
+          <a:ext cx="0" cy="0"/>
+          <a:chOff x="0" y="0"/>
+          <a:chExt cx="0" cy="0"/>
+        </a:xfrm>
+      </p:grpSpPr>
+      <p:sp>
+        <p:nvSpPr>
+          <p:cNvPr id="3" name="Marcador de Posição de Conteúdo 2"/>
+          <p:cNvSpPr>
+            <a:spLocks noGrp="1"/>
+          </p:cNvSpPr>
+          <p:nvPr>
+            <p:ph idx="1"/>
+          </p:nvPr>
+        </p:nvSpPr>
+        <p:spPr>
+          <a:xfrm>
+            <a:off x="838200" y="516834"/>
+            <a:ext cx="10515600" cy="6341165"/>
+          </a:xfrm>
+        </p:spPr>
+        <p:txBody>
+          <a:bodyPr>
+            <a:normAutofit fontScale="85000" lnSpcReduction="10000"/>
+          </a:bodyPr>
+          <a:lstStyle/>
+          <a:p>
+            <a:pPr marL="514350" indent="-514350" fontAlgn="base">
+              <a:lnSpc>
+                <a:spcPct val="120000"/>
+              </a:lnSpc>
+              <a:buFont typeface="+mj-lt"/>
+              <a:buAutoNum type="arabicPeriod" startAt="11"/>
+            </a:pPr>
+            <a:r>
+              <a:rPr lang="pt-PT" dirty="0" smtClean="0"/>
+              <a:t>Saber os livros que têm uma dada CDU.</a:t>
+            </a:r>
+            <a:endParaRPr lang="en-US" dirty="0" smtClean="0"/>
+          </a:p>
+          <a:p>
+            <a:pPr marL="514350" indent="-514350" fontAlgn="base">
+              <a:lnSpc>
+                <a:spcPct val="120000"/>
+              </a:lnSpc>
+              <a:buFont typeface="+mj-lt"/>
+              <a:buAutoNum type="arabicPeriod" startAt="11"/>
+            </a:pPr>
+            <a:r>
+              <a:rPr lang="pt-PT" dirty="0" smtClean="0"/>
+              <a:t>Fazer pesquisa por título do livro, que corresponde a obter uma lista de livros que têm no seu título o conjunto de palavras indicado no campo da pesquisa.</a:t>
+            </a:r>
+            <a:endParaRPr lang="en-US" dirty="0" smtClean="0"/>
+          </a:p>
+          <a:p>
+            <a:pPr marL="514350" indent="-514350" fontAlgn="base">
+              <a:lnSpc>
+                <a:spcPct val="120000"/>
+              </a:lnSpc>
+              <a:buFont typeface="+mj-lt"/>
+              <a:buAutoNum type="arabicPeriod" startAt="11"/>
+            </a:pPr>
+            <a:r>
+              <a:rPr lang="pt-PT" dirty="0" smtClean="0"/>
+              <a:t>Para um dado livro, saber o seu ISSN, ISBN, código de barras, título, editora, autor, edição, CDU, ano de publicação e número de exemplares.</a:t>
+            </a:r>
+            <a:endParaRPr lang="en-US" dirty="0" smtClean="0"/>
+          </a:p>
+          <a:p>
+            <a:pPr marL="514350" indent="-514350" fontAlgn="base">
+              <a:lnSpc>
+                <a:spcPct val="120000"/>
+              </a:lnSpc>
+              <a:buFont typeface="+mj-lt"/>
+              <a:buAutoNum type="arabicPeriod" startAt="11"/>
+            </a:pPr>
+            <a:r>
+              <a:rPr lang="pt-PT" dirty="0" smtClean="0"/>
+              <a:t>Saber a localização de livros de uma certa CDU.</a:t>
+            </a:r>
+            <a:endParaRPr lang="en-US" dirty="0" smtClean="0"/>
+          </a:p>
+          <a:p>
+            <a:pPr marL="514350" indent="-514350" fontAlgn="base">
+              <a:lnSpc>
+                <a:spcPct val="120000"/>
+              </a:lnSpc>
+              <a:buFont typeface="+mj-lt"/>
+              <a:buAutoNum type="arabicPeriod" startAt="11"/>
+            </a:pPr>
+            <a:r>
+              <a:rPr lang="pt-PT" dirty="0" smtClean="0"/>
+              <a:t>Para cada exemplar saber o estado de disponibilidade (reservado, requisitado ou não requisitável), o estado de conservação do exemplar bem como a sua localização na biblioteca (piso, estante e prateleira).</a:t>
+            </a:r>
+            <a:endParaRPr lang="en-US" dirty="0" smtClean="0"/>
+          </a:p>
+          <a:p>
+            <a:pPr marL="514350" lvl="0" indent="-514350" fontAlgn="base">
+              <a:lnSpc>
+                <a:spcPct val="120000"/>
+              </a:lnSpc>
+              <a:buFont typeface="+mj-lt"/>
+              <a:buAutoNum type="arabicPeriod" startAt="11"/>
+            </a:pPr>
+            <a:r>
+              <a:rPr lang="pt-PT" dirty="0" smtClean="0"/>
+              <a:t>Reservar exemplares de um ou mais livros.</a:t>
+            </a:r>
+            <a:endParaRPr lang="en-US" dirty="0" smtClean="0"/>
+          </a:p>
+          <a:p>
+            <a:pPr marL="514350" indent="-514350" fontAlgn="base">
+              <a:lnSpc>
+                <a:spcPct val="120000"/>
+              </a:lnSpc>
+              <a:buFont typeface="+mj-lt"/>
+              <a:buAutoNum type="arabicPeriod" startAt="11"/>
+            </a:pPr>
+            <a:r>
+              <a:rPr lang="pt-PT" dirty="0" smtClean="0"/>
+              <a:t>Saber data de reserva e seu estado (pendente, exemplar disponível para levantamento, reserva concluída ou cancelada).</a:t>
+            </a:r>
+            <a:endParaRPr lang="en-US" dirty="0" smtClean="0"/>
+          </a:p>
+          <a:p>
+            <a:pPr marL="514350" indent="-514350" fontAlgn="base">
+              <a:lnSpc>
+                <a:spcPct val="120000"/>
+              </a:lnSpc>
+              <a:buFont typeface="+mj-lt"/>
+              <a:buAutoNum type="arabicPeriod" startAt="11"/>
+            </a:pPr>
+            <a:r>
+              <a:rPr lang="pt-PT" dirty="0" smtClean="0"/>
+              <a:t>Cancelar reserva de exemplar.</a:t>
+            </a:r>
+            <a:endParaRPr lang="en-US" dirty="0" smtClean="0"/>
+          </a:p>
+        </p:txBody>
+      </p:sp>
+    </p:spTree>
+    <p:extLst>
+      <p:ext uri="{BB962C8B-B14F-4D97-AF65-F5344CB8AC3E}">
+        <p14:creationId xmlns:p14="http://schemas.microsoft.com/office/powerpoint/2010/main" val="2769558942"/>
+      </p:ext>
+    </p:extLst>
+  </p:cSld>
+  <p:clrMapOvr>
+    <a:masterClrMapping/>
+  </p:clrMapOvr>
+</p:sld>
+</file>
+
+<file path=ppt/slides/slide22.xml><?xml version="1.0" encoding="utf-8"?>
+<p:sld xmlns:a="http://schemas.openxmlformats.org/drawingml/2006/main" xmlns:r="http://schemas.openxmlformats.org/officeDocument/2006/relationships" xmlns:p="http://schemas.openxmlformats.org/presentationml/2006/main">
+  <p:cSld>
+    <p:spTree>
+      <p:nvGrpSpPr>
+        <p:cNvPr id="1" name=""/>
+        <p:cNvGrpSpPr/>
+        <p:nvPr/>
+      </p:nvGrpSpPr>
+      <p:grpSpPr>
+        <a:xfrm>
+          <a:off x="0" y="0"/>
+          <a:ext cx="0" cy="0"/>
+          <a:chOff x="0" y="0"/>
+          <a:chExt cx="0" cy="0"/>
+        </a:xfrm>
+      </p:grpSpPr>
+      <p:sp>
+        <p:nvSpPr>
+          <p:cNvPr id="3" name="Marcador de Posição de Conteúdo 2"/>
+          <p:cNvSpPr>
+            <a:spLocks noGrp="1"/>
+          </p:cNvSpPr>
+          <p:nvPr>
+            <p:ph idx="1"/>
+          </p:nvPr>
+        </p:nvSpPr>
+        <p:spPr>
+          <a:xfrm>
+            <a:off x="746760" y="384313"/>
+            <a:ext cx="10515600" cy="6241773"/>
+          </a:xfrm>
+        </p:spPr>
+        <p:txBody>
+          <a:bodyPr>
+            <a:normAutofit fontScale="85000" lnSpcReduction="20000"/>
+          </a:bodyPr>
+          <a:lstStyle/>
+          <a:p>
+            <a:pPr marL="514350" indent="-514350" fontAlgn="base">
+              <a:lnSpc>
+                <a:spcPct val="120000"/>
+              </a:lnSpc>
+              <a:buFont typeface="+mj-lt"/>
+              <a:buAutoNum type="arabicPeriod" startAt="19"/>
+            </a:pPr>
+            <a:r>
+              <a:rPr lang="pt-PT" dirty="0" smtClean="0"/>
+              <a:t>Efetuar requisição de um exemplar.</a:t>
+            </a:r>
+            <a:endParaRPr lang="en-US" dirty="0" smtClean="0"/>
+          </a:p>
+          <a:p>
+            <a:pPr marL="514350" indent="-514350" fontAlgn="base">
+              <a:lnSpc>
+                <a:spcPct val="120000"/>
+              </a:lnSpc>
+              <a:buFont typeface="+mj-lt"/>
+              <a:buAutoNum type="arabicPeriod" startAt="19"/>
+            </a:pPr>
+            <a:r>
+              <a:rPr lang="pt-PT" dirty="0" smtClean="0"/>
+              <a:t>Para uma requisição, saber o seu estado (ativa ou não), em que data foi realizada, em que data deverá ser entregue o exemplar qual o número de renovações efetuado e qual o número de máximo de renovações em vigor na data da reserva.</a:t>
+            </a:r>
+            <a:endParaRPr lang="en-US" dirty="0" smtClean="0"/>
+          </a:p>
+          <a:p>
+            <a:pPr marL="514350" indent="-514350" fontAlgn="base">
+              <a:lnSpc>
+                <a:spcPct val="120000"/>
+              </a:lnSpc>
+              <a:buFont typeface="+mj-lt"/>
+              <a:buAutoNum type="arabicPeriod" startAt="19"/>
+            </a:pPr>
+            <a:r>
+              <a:rPr lang="pt-PT" dirty="0" smtClean="0"/>
+              <a:t>Renovar uma requisição, não excedendo o número máximo de renovações permitido.</a:t>
+            </a:r>
+          </a:p>
+          <a:p>
+            <a:pPr marL="514350" lvl="0" indent="-514350">
+              <a:lnSpc>
+                <a:spcPct val="120000"/>
+              </a:lnSpc>
+              <a:buFont typeface="+mj-lt"/>
+              <a:buAutoNum type="arabicPeriod" startAt="22"/>
+            </a:pPr>
+            <a:r>
+              <a:rPr lang="pt-PT" dirty="0" smtClean="0"/>
+              <a:t>Concluir </a:t>
+            </a:r>
+            <a:r>
+              <a:rPr lang="pt-PT" dirty="0"/>
+              <a:t>requisição, que corresponde à devolução do exemplar requisitado</a:t>
+            </a:r>
+            <a:r>
+              <a:rPr lang="pt-PT" dirty="0" smtClean="0"/>
+              <a:t>.</a:t>
+            </a:r>
+            <a:endParaRPr lang="en-US" dirty="0"/>
+          </a:p>
+          <a:p>
+            <a:pPr marL="514350" lvl="0" indent="-514350" fontAlgn="base">
+              <a:lnSpc>
+                <a:spcPct val="120000"/>
+              </a:lnSpc>
+              <a:buFont typeface="+mj-lt"/>
+              <a:buAutoNum type="arabicPeriod" startAt="22"/>
+            </a:pPr>
+            <a:r>
+              <a:rPr lang="pt-PT" dirty="0"/>
+              <a:t>Gerar estatísticas de número de renovações médio e saber quantos utilizadores usam o número máximo de requisições permitidas</a:t>
+            </a:r>
+            <a:r>
+              <a:rPr lang="pt-PT" dirty="0" smtClean="0"/>
+              <a:t>.</a:t>
+            </a:r>
+          </a:p>
+          <a:p>
+            <a:pPr marL="514350" indent="-514350" fontAlgn="base">
+              <a:lnSpc>
+                <a:spcPct val="120000"/>
+              </a:lnSpc>
+              <a:buFont typeface="+mj-lt"/>
+              <a:buAutoNum type="arabicPeriod" startAt="22"/>
+            </a:pPr>
+            <a:r>
+              <a:rPr lang="pt-PT" dirty="0" smtClean="0">
+                <a:effectLst/>
+              </a:rPr>
+              <a:t>Registar utilizadores internos ou externos como requisitantes.</a:t>
+            </a:r>
+            <a:endParaRPr lang="en-US" dirty="0" smtClean="0">
+              <a:effectLst/>
+            </a:endParaRPr>
+          </a:p>
+          <a:p>
+            <a:pPr marL="514350" indent="-514350" fontAlgn="base">
+              <a:lnSpc>
+                <a:spcPct val="120000"/>
+              </a:lnSpc>
+              <a:buFont typeface="+mj-lt"/>
+              <a:buAutoNum type="arabicPeriod" startAt="22"/>
+            </a:pPr>
+            <a:r>
+              <a:rPr lang="pt-PT" dirty="0" smtClean="0">
+                <a:effectLst/>
+              </a:rPr>
+              <a:t>Para um dado utilizador, saber o seu tipo, nome, email (contacto principal), CC, número mecanográfico e contacto alternativo (telefone).</a:t>
+            </a:r>
+            <a:endParaRPr lang="en-US" dirty="0" smtClean="0">
+              <a:effectLst/>
+            </a:endParaRPr>
+          </a:p>
+          <a:p>
+            <a:pPr marL="514350" indent="-514350" fontAlgn="base">
+              <a:lnSpc>
+                <a:spcPct val="120000"/>
+              </a:lnSpc>
+              <a:buFont typeface="+mj-lt"/>
+              <a:buAutoNum type="arabicPeriod" startAt="22"/>
+            </a:pPr>
+            <a:r>
+              <a:rPr lang="pt-PT" dirty="0"/>
+              <a:t>Saber os utilizadores que reservaram/requisitaram determinado exemplar</a:t>
+            </a:r>
+            <a:r>
+              <a:rPr lang="pt-PT" dirty="0" smtClean="0"/>
+              <a:t>.</a:t>
+            </a:r>
+            <a:endParaRPr lang="en-US" dirty="0"/>
+          </a:p>
+          <a:p>
+            <a:endParaRPr lang="en-US" dirty="0"/>
+          </a:p>
+        </p:txBody>
+      </p:sp>
+    </p:spTree>
+    <p:extLst>
+      <p:ext uri="{BB962C8B-B14F-4D97-AF65-F5344CB8AC3E}">
+        <p14:creationId xmlns:p14="http://schemas.microsoft.com/office/powerpoint/2010/main" val="2856968020"/>
+      </p:ext>
+    </p:extLst>
+  </p:cSld>
+  <p:clrMapOvr>
+    <a:masterClrMapping/>
+  </p:clrMapOvr>
+</p:sld>
+</file>
+
+<file path=ppt/slides/slide23.xml><?xml version="1.0" encoding="utf-8"?>
+<p:sld xmlns:a="http://schemas.openxmlformats.org/drawingml/2006/main" xmlns:r="http://schemas.openxmlformats.org/officeDocument/2006/relationships" xmlns:p="http://schemas.openxmlformats.org/presentationml/2006/main">
+  <p:cSld>
+    <p:spTree>
+      <p:nvGrpSpPr>
+        <p:cNvPr id="1" name=""/>
+        <p:cNvGrpSpPr/>
+        <p:nvPr/>
+      </p:nvGrpSpPr>
+      <p:grpSpPr>
+        <a:xfrm>
+          <a:off x="0" y="0"/>
+          <a:ext cx="0" cy="0"/>
+          <a:chOff x="0" y="0"/>
+          <a:chExt cx="0" cy="0"/>
+        </a:xfrm>
+      </p:grpSpPr>
+      <p:sp>
+        <p:nvSpPr>
+          <p:cNvPr id="2" name="Título 1"/>
+          <p:cNvSpPr>
+            <a:spLocks noGrp="1"/>
+          </p:cNvSpPr>
+          <p:nvPr>
+            <p:ph type="title"/>
+          </p:nvPr>
+        </p:nvSpPr>
+        <p:spPr/>
+        <p:txBody>
+          <a:bodyPr/>
+          <a:lstStyle/>
+          <a:p>
+            <a:pPr lvl="1" algn="l" rtl="0">
+              <a:lnSpc>
+                <a:spcPct val="90000"/>
+              </a:lnSpc>
+              <a:spcBef>
+                <a:spcPct val="0"/>
+              </a:spcBef>
+            </a:pPr>
+            <a:r>
+              <a:rPr lang="pt-PT" sz="2800" b="1" dirty="0" smtClean="0"/>
+              <a:t>Validação do Modelo Conceptual segundo as </a:t>
+            </a:r>
+            <a:r>
+              <a:rPr lang="pt-PT" sz="2800" b="1" u="sng" dirty="0" smtClean="0"/>
+              <a:t>transações</a:t>
+            </a:r>
+            <a:endParaRPr lang="en-US" b="1" u="sng" dirty="0"/>
+          </a:p>
+        </p:txBody>
+      </p:sp>
+      <p:sp>
+        <p:nvSpPr>
+          <p:cNvPr id="3" name="Marcador de Posição de Conteúdo 2"/>
+          <p:cNvSpPr>
+            <a:spLocks noGrp="1"/>
+          </p:cNvSpPr>
+          <p:nvPr>
+            <p:ph idx="1"/>
+          </p:nvPr>
+        </p:nvSpPr>
+        <p:spPr/>
+        <p:txBody>
+          <a:bodyPr/>
+          <a:lstStyle/>
+          <a:p>
+            <a:pPr marL="514350" lvl="0" indent="-514350">
+              <a:lnSpc>
+                <a:spcPct val="200000"/>
+              </a:lnSpc>
+              <a:buFont typeface="+mj-lt"/>
+              <a:buAutoNum type="arabicPeriod"/>
+            </a:pPr>
+            <a:r>
+              <a:rPr lang="pt-PT" dirty="0"/>
+              <a:t>Qual(is) a(s) localização(ões) (piso, estante e prateleira) dos exemplares de um livro com determinado título?</a:t>
+            </a:r>
+            <a:endParaRPr lang="en-US" dirty="0"/>
+          </a:p>
+          <a:p>
+            <a:pPr marL="514350" lvl="0" indent="-514350">
+              <a:lnSpc>
+                <a:spcPct val="200000"/>
+              </a:lnSpc>
+              <a:buFont typeface="+mj-lt"/>
+              <a:buAutoNum type="arabicPeriod"/>
+            </a:pPr>
+            <a:r>
+              <a:rPr lang="pt-PT" dirty="0"/>
+              <a:t>Efetuar uma requisição</a:t>
+            </a:r>
+            <a:endParaRPr lang="en-US" dirty="0"/>
+          </a:p>
+          <a:p>
+            <a:pPr marL="514350" lvl="0" indent="-514350">
+              <a:lnSpc>
+                <a:spcPct val="200000"/>
+              </a:lnSpc>
+              <a:buFont typeface="+mj-lt"/>
+              <a:buAutoNum type="arabicPeriod"/>
+            </a:pPr>
+            <a:r>
+              <a:rPr lang="pt-PT" dirty="0" smtClean="0"/>
+              <a:t>Efetuar </a:t>
+            </a:r>
+            <a:r>
+              <a:rPr lang="pt-PT" dirty="0"/>
+              <a:t>uma reserva</a:t>
+            </a:r>
+            <a:endParaRPr lang="en-US" dirty="0"/>
+          </a:p>
+          <a:p>
+            <a:endParaRPr lang="en-US" dirty="0"/>
+          </a:p>
+        </p:txBody>
+      </p:sp>
+    </p:spTree>
+    <p:extLst>
+      <p:ext uri="{BB962C8B-B14F-4D97-AF65-F5344CB8AC3E}">
+        <p14:creationId xmlns:p14="http://schemas.microsoft.com/office/powerpoint/2010/main" val="273823033"/>
+      </p:ext>
+    </p:extLst>
+  </p:cSld>
+  <p:clrMapOvr>
+    <a:masterClrMapping/>
+  </p:clrMapOvr>
+</p:sld>
+</file>
+
+<file path=ppt/slides/slide24.xml><?xml version="1.0" encoding="utf-8"?>
 <p:sld xmlns:a="http://schemas.openxmlformats.org/drawingml/2006/main" xmlns:r="http://schemas.openxmlformats.org/officeDocument/2006/relationships" xmlns:p="http://schemas.openxmlformats.org/presentationml/2006/main" showMasterSp="0">
   <p:cSld>
     <p:spTree>
@@ -7075,7 +9016,7 @@
 </p:sld>
 </file>
 
-<file path=ppt/slides/slide21.xml><?xml version="1.0" encoding="utf-8"?>
+<file path=ppt/slides/slide25.xml><?xml version="1.0" encoding="utf-8"?>
 <p:sld xmlns:a="http://schemas.openxmlformats.org/drawingml/2006/main" xmlns:r="http://schemas.openxmlformats.org/officeDocument/2006/relationships" xmlns:p="http://schemas.openxmlformats.org/presentationml/2006/main" showMasterSp="0">
   <p:cSld>
     <p:spTree>
@@ -7335,7 +9276,7 @@
 </p:sld>
 </file>
 
-<file path=ppt/slides/slide22.xml><?xml version="1.0" encoding="utf-8"?>
+<file path=ppt/slides/slide26.xml><?xml version="1.0" encoding="utf-8"?>
 <p:sld xmlns:a="http://schemas.openxmlformats.org/drawingml/2006/main" xmlns:r="http://schemas.openxmlformats.org/officeDocument/2006/relationships" xmlns:p="http://schemas.openxmlformats.org/presentationml/2006/main" showMasterSp="0">
   <p:cSld>
     <p:spTree>
@@ -7403,7 +9344,7 @@
 </p:sld>
 </file>
 
-<file path=ppt/slides/slide23.xml><?xml version="1.0" encoding="utf-8"?>
+<file path=ppt/slides/slide27.xml><?xml version="1.0" encoding="utf-8"?>
 <p:sld xmlns:a="http://schemas.openxmlformats.org/drawingml/2006/main" xmlns:r="http://schemas.openxmlformats.org/officeDocument/2006/relationships" xmlns:p="http://schemas.openxmlformats.org/presentationml/2006/main" showMasterSp="0">
   <p:cSld>
     <p:spTree>
@@ -7487,7 +9428,7 @@
 </p:sld>
 </file>
 
-<file path=ppt/slides/slide24.xml><?xml version="1.0" encoding="utf-8"?>
+<file path=ppt/slides/slide28.xml><?xml version="1.0" encoding="utf-8"?>
 <p:sld xmlns:a="http://schemas.openxmlformats.org/drawingml/2006/main" xmlns:r="http://schemas.openxmlformats.org/officeDocument/2006/relationships" xmlns:p="http://schemas.openxmlformats.org/presentationml/2006/main" showMasterSp="0">
   <p:cSld>
     <p:spTree>
@@ -7654,7 +9595,7 @@
 </p:sld>
 </file>
 
-<file path=ppt/slides/slide25.xml><?xml version="1.0" encoding="utf-8"?>
+<file path=ppt/slides/slide29.xml><?xml version="1.0" encoding="utf-8"?>
 <p:sld xmlns:a="http://schemas.openxmlformats.org/drawingml/2006/main" xmlns:r="http://schemas.openxmlformats.org/officeDocument/2006/relationships" xmlns:p="http://schemas.openxmlformats.org/presentationml/2006/main">
   <p:cSld>
     <p:spTree>
@@ -7713,83 +9654,6 @@
     <p:extLst>
       <p:ext uri="{BB962C8B-B14F-4D97-AF65-F5344CB8AC3E}">
         <p14:creationId xmlns:p14="http://schemas.microsoft.com/office/powerpoint/2010/main" val="682434047"/>
-      </p:ext>
-    </p:extLst>
-  </p:cSld>
-  <p:clrMapOvr>
-    <a:masterClrMapping/>
-  </p:clrMapOvr>
-</p:sld>
-</file>
-
-<file path=ppt/slides/slide26.xml><?xml version="1.0" encoding="utf-8"?>
-<p:sld xmlns:a="http://schemas.openxmlformats.org/drawingml/2006/main" xmlns:r="http://schemas.openxmlformats.org/officeDocument/2006/relationships" xmlns:p="http://schemas.openxmlformats.org/presentationml/2006/main">
-  <p:cSld>
-    <p:spTree>
-      <p:nvGrpSpPr>
-        <p:cNvPr id="1" name=""/>
-        <p:cNvGrpSpPr/>
-        <p:nvPr/>
-      </p:nvGrpSpPr>
-      <p:grpSpPr>
-        <a:xfrm>
-          <a:off x="0" y="0"/>
-          <a:ext cx="0" cy="0"/>
-          <a:chOff x="0" y="0"/>
-          <a:chExt cx="0" cy="0"/>
-        </a:xfrm>
-      </p:grpSpPr>
-      <p:sp>
-        <p:nvSpPr>
-          <p:cNvPr id="2" name="Título 1"/>
-          <p:cNvSpPr>
-            <a:spLocks noGrp="1"/>
-          </p:cNvSpPr>
-          <p:nvPr>
-            <p:ph type="title"/>
-          </p:nvPr>
-        </p:nvSpPr>
-        <p:spPr/>
-        <p:txBody>
-          <a:bodyPr/>
-          <a:lstStyle/>
-          <a:p>
-            <a:pPr lvl="0"/>
-            <a:r>
-              <a:rPr lang="pt-PT" b="1" dirty="0"/>
-              <a:t>Conclusões e Trabalho </a:t>
-            </a:r>
-            <a:r>
-              <a:rPr lang="pt-PT" b="1" dirty="0" smtClean="0"/>
-              <a:t>Futuro</a:t>
-            </a:r>
-            <a:endParaRPr lang="en-US" dirty="0"/>
-          </a:p>
-        </p:txBody>
-      </p:sp>
-      <p:sp>
-        <p:nvSpPr>
-          <p:cNvPr id="3" name="Marcador de Posição de Conteúdo 2"/>
-          <p:cNvSpPr>
-            <a:spLocks noGrp="1"/>
-          </p:cNvSpPr>
-          <p:nvPr>
-            <p:ph idx="1"/>
-          </p:nvPr>
-        </p:nvSpPr>
-        <p:spPr/>
-        <p:txBody>
-          <a:bodyPr/>
-          <a:lstStyle/>
-          <a:p>
-            <a:endParaRPr lang="en-US" dirty="0"/>
-          </a:p>
-        </p:txBody>
-      </p:sp>
-    </p:spTree>
-    <p:extLst>
-      <p:ext uri="{BB962C8B-B14F-4D97-AF65-F5344CB8AC3E}">
-        <p14:creationId xmlns:p14="http://schemas.microsoft.com/office/powerpoint/2010/main" val="3237368206"/>
       </p:ext>
     </p:extLst>
   </p:cSld>
@@ -7890,13 +9754,20 @@
             </a:pPr>
             <a:r>
               <a:rPr lang="pt-PT" sz="2400" dirty="0" smtClean="0"/>
-              <a:t>Sistemas de consultas bibliográficas e de </a:t>
-            </a:r>
+              <a:t>Sistemas de consultas bibliográficas e de requisições</a:t>
+            </a:r>
+            <a:endParaRPr lang="pt-PT" sz="2400" dirty="0"/>
+          </a:p>
+          <a:p>
+            <a:pPr algn="just">
+              <a:lnSpc>
+                <a:spcPct val="150000"/>
+              </a:lnSpc>
+            </a:pPr>
             <a:r>
               <a:rPr lang="pt-PT" sz="2400" dirty="0" smtClean="0"/>
-              <a:t>requisições</a:t>
-            </a:r>
-            <a:endParaRPr lang="pt-PT" sz="2400" dirty="0"/>
+              <a:t>Levantamento de Requisitos e análise </a:t>
+            </a:r>
           </a:p>
           <a:p>
             <a:pPr algn="just">
@@ -7906,26 +9777,7 @@
             </a:pPr>
             <a:r>
               <a:rPr lang="pt-PT" sz="2400" dirty="0" smtClean="0"/>
-              <a:t>Levantamento </a:t>
-            </a:r>
-            <a:r>
-              <a:rPr lang="pt-PT" sz="2400" dirty="0" smtClean="0"/>
-              <a:t>de Requisitos e análise </a:t>
-            </a:r>
-          </a:p>
-          <a:p>
-            <a:pPr algn="just">
-              <a:lnSpc>
-                <a:spcPct val="150000"/>
-              </a:lnSpc>
-            </a:pPr>
-            <a:r>
-              <a:rPr lang="pt-PT" sz="2400" dirty="0" smtClean="0"/>
-              <a:t>Modelo </a:t>
-            </a:r>
-            <a:r>
-              <a:rPr lang="pt-PT" sz="2400" dirty="0" smtClean="0"/>
-              <a:t>conceptual e L</a:t>
+              <a:t>Modelo conceptual e L</a:t>
             </a:r>
             <a:r>
               <a:rPr lang="en-US" sz="2400" dirty="0" smtClean="0"/>
@@ -7940,11 +9792,7 @@
             </a:pPr>
             <a:r>
               <a:rPr lang="pt-PT" sz="2400" dirty="0" smtClean="0"/>
-              <a:t>Modelo </a:t>
-            </a:r>
-            <a:r>
-              <a:rPr lang="pt-PT" sz="2400" dirty="0" smtClean="0"/>
-              <a:t>físico, tamanho, povoamento…</a:t>
+              <a:t>Modelo físico, tamanho, povoamento…</a:t>
             </a:r>
           </a:p>
         </p:txBody>
@@ -7953,6 +9801,83 @@
     <p:extLst>
       <p:ext uri="{BB962C8B-B14F-4D97-AF65-F5344CB8AC3E}">
         <p14:creationId xmlns:p14="http://schemas.microsoft.com/office/powerpoint/2010/main" val="4070182531"/>
+      </p:ext>
+    </p:extLst>
+  </p:cSld>
+  <p:clrMapOvr>
+    <a:masterClrMapping/>
+  </p:clrMapOvr>
+</p:sld>
+</file>
+
+<file path=ppt/slides/slide30.xml><?xml version="1.0" encoding="utf-8"?>
+<p:sld xmlns:a="http://schemas.openxmlformats.org/drawingml/2006/main" xmlns:r="http://schemas.openxmlformats.org/officeDocument/2006/relationships" xmlns:p="http://schemas.openxmlformats.org/presentationml/2006/main">
+  <p:cSld>
+    <p:spTree>
+      <p:nvGrpSpPr>
+        <p:cNvPr id="1" name=""/>
+        <p:cNvGrpSpPr/>
+        <p:nvPr/>
+      </p:nvGrpSpPr>
+      <p:grpSpPr>
+        <a:xfrm>
+          <a:off x="0" y="0"/>
+          <a:ext cx="0" cy="0"/>
+          <a:chOff x="0" y="0"/>
+          <a:chExt cx="0" cy="0"/>
+        </a:xfrm>
+      </p:grpSpPr>
+      <p:sp>
+        <p:nvSpPr>
+          <p:cNvPr id="2" name="Título 1"/>
+          <p:cNvSpPr>
+            <a:spLocks noGrp="1"/>
+          </p:cNvSpPr>
+          <p:nvPr>
+            <p:ph type="title"/>
+          </p:nvPr>
+        </p:nvSpPr>
+        <p:spPr/>
+        <p:txBody>
+          <a:bodyPr/>
+          <a:lstStyle/>
+          <a:p>
+            <a:pPr lvl="0"/>
+            <a:r>
+              <a:rPr lang="pt-PT" b="1" dirty="0"/>
+              <a:t>Conclusões e Trabalho </a:t>
+            </a:r>
+            <a:r>
+              <a:rPr lang="pt-PT" b="1" dirty="0" smtClean="0"/>
+              <a:t>Futuro</a:t>
+            </a:r>
+            <a:endParaRPr lang="en-US" dirty="0"/>
+          </a:p>
+        </p:txBody>
+      </p:sp>
+      <p:sp>
+        <p:nvSpPr>
+          <p:cNvPr id="3" name="Marcador de Posição de Conteúdo 2"/>
+          <p:cNvSpPr>
+            <a:spLocks noGrp="1"/>
+          </p:cNvSpPr>
+          <p:nvPr>
+            <p:ph idx="1"/>
+          </p:nvPr>
+        </p:nvSpPr>
+        <p:spPr/>
+        <p:txBody>
+          <a:bodyPr/>
+          <a:lstStyle/>
+          <a:p>
+            <a:endParaRPr lang="en-US" dirty="0"/>
+          </a:p>
+        </p:txBody>
+      </p:sp>
+    </p:spTree>
+    <p:extLst>
+      <p:ext uri="{BB962C8B-B14F-4D97-AF65-F5344CB8AC3E}">
+        <p14:creationId xmlns:p14="http://schemas.microsoft.com/office/powerpoint/2010/main" val="3237368206"/>
       </p:ext>
     </p:extLst>
   </p:cSld>
@@ -8110,15 +10035,7 @@
           <a:effectLst>
             <a:reflection blurRad="12700" stA="38000" endPos="28000" dist="5000" dir="5400000" sy="-100000" algn="bl" rotWithShape="0"/>
           </a:effectLst>
-          <a:extLst>
-            <a:ext uri="{909E8E84-426E-40DD-AFC4-6F175D3DCCD1}">
-              <a14:hiddenFill xmlns:a14="http://schemas.microsoft.com/office/drawing/2010/main">
-                <a:solidFill>
-                  <a:srgbClr val="FFFFFF"/>
-                </a:solidFill>
-              </a14:hiddenFill>
-            </a:ext>
-          </a:extLst>
+          <a:extLst/>
         </p:spPr>
       </p:pic>
     </p:spTree>
@@ -8466,11 +10383,7 @@
             </a:pPr>
             <a:r>
               <a:rPr lang="pt-PT" dirty="0" smtClean="0"/>
-              <a:t>Necessidade premente de uma resposta eficiente e eficaz</a:t>
-            </a:r>
-            <a:r>
-              <a:rPr lang="pt-PT" dirty="0" smtClean="0"/>
-              <a:t>.</a:t>
+              <a:t>Necessidade premente de uma resposta eficiente e eficaz.</a:t>
             </a:r>
             <a:endParaRPr lang="pt-PT" dirty="0"/>
           </a:p>
@@ -8493,11 +10406,7 @@
             </a:pPr>
             <a:r>
               <a:rPr lang="pt-PT" dirty="0" smtClean="0"/>
-              <a:t>Pode ser reaproveitado para outros casos de estudo (comércio a retalho, etc. …) pois envolve a catalogação e localização dos produtos em questão</a:t>
-            </a:r>
-            <a:r>
-              <a:rPr lang="pt-PT" dirty="0" smtClean="0"/>
-              <a:t>.</a:t>
+              <a:t>Pode ser reaproveitado para outros casos de estudo (comércio a retalho, etc. …) pois envolve a catalogação e localização dos produtos em questão.</a:t>
             </a:r>
             <a:endParaRPr lang="pt-PT" dirty="0"/>
           </a:p>
@@ -8688,27 +10597,19 @@
             </a:pPr>
             <a:r>
               <a:rPr lang="pt-PT" sz="2000" dirty="0" smtClean="0"/>
-              <a:t>Elaborar modelos </a:t>
-            </a:r>
+              <a:t>Elaborar modelos conceptual</a:t>
+            </a:r>
+          </a:p>
+          <a:p>
+            <a:pPr marL="914400" lvl="2" indent="0" algn="just">
+              <a:lnSpc>
+                <a:spcPct val="150000"/>
+              </a:lnSpc>
+              <a:buNone/>
+            </a:pPr>
             <a:r>
               <a:rPr lang="pt-PT" sz="2000" dirty="0" smtClean="0"/>
-              <a:t>conceptual</a:t>
-            </a:r>
-          </a:p>
-          <a:p>
-            <a:pPr marL="914400" lvl="2" indent="0" algn="just">
-              <a:lnSpc>
-                <a:spcPct val="150000"/>
-              </a:lnSpc>
-              <a:buNone/>
-            </a:pPr>
-            <a:r>
-              <a:rPr lang="pt-PT" sz="2000" dirty="0" smtClean="0"/>
-              <a:t>lógico </a:t>
-            </a:r>
-            <a:r>
-              <a:rPr lang="pt-PT" sz="2000" dirty="0" smtClean="0"/>
-              <a:t>e físico (de acordo com os requisitos)</a:t>
+              <a:t>lógico e físico (de acordo com os requisitos)</a:t>
             </a:r>
           </a:p>
           <a:p>
@@ -8721,13 +10622,8 @@
             </a:pPr>
             <a:r>
               <a:rPr lang="pt-PT" sz="2000" dirty="0" smtClean="0"/>
-              <a:t>Validar os </a:t>
-            </a:r>
-            <a:r>
-              <a:rPr lang="pt-PT" sz="2000" dirty="0" smtClean="0"/>
-              <a:t>mesmos</a:t>
-            </a:r>
-            <a:endParaRPr lang="pt-PT" sz="2000" dirty="0" smtClean="0"/>
+              <a:t>Validar os mesmos</a:t>
+            </a:r>
           </a:p>
         </p:txBody>
       </p:sp>
@@ -8773,15 +10669,7 @@
           <a:effectLst>
             <a:reflection blurRad="12700" stA="38000" endPos="28000" dist="5000" dir="5400000" sy="-100000" algn="bl" rotWithShape="0"/>
           </a:effectLst>
-          <a:extLst>
-            <a:ext uri="{909E8E84-426E-40DD-AFC4-6F175D3DCCD1}">
-              <a14:hiddenFill xmlns:a14="http://schemas.microsoft.com/office/drawing/2010/main">
-                <a:solidFill>
-                  <a:srgbClr val="FFFFFF"/>
-                </a:solidFill>
-              </a14:hiddenFill>
-            </a:ext>
-          </a:extLst>
+          <a:extLst/>
         </p:spPr>
       </p:pic>
     </p:spTree>
@@ -8883,11 +10771,7 @@
             </a:pPr>
             <a:r>
               <a:rPr lang="pt-PT" sz="3000" dirty="0" smtClean="0"/>
-              <a:t>Identificação dos </a:t>
-            </a:r>
-            <a:r>
-              <a:rPr lang="pt-PT" sz="3000" dirty="0" smtClean="0"/>
-              <a:t>Relacionamentos</a:t>
+              <a:t>Identificação dos Relacionamentos</a:t>
             </a:r>
           </a:p>
           <a:p>

</xml_diff>